<commit_message>
merged with windows desktop
</commit_message>
<xml_diff>
--- a/movie_recommender_system/report/CS657 - Homework 4 Report.pptx
+++ b/movie_recommender_system/report/CS657 - Homework 4 Report.pptx
@@ -7,16 +7,15 @@
   <p:sldIdLst>
     <p:sldId id="256" r:id="rId2"/>
     <p:sldId id="273" r:id="rId3"/>
-    <p:sldId id="269" r:id="rId4"/>
-    <p:sldId id="268" r:id="rId5"/>
-    <p:sldId id="271" r:id="rId6"/>
-    <p:sldId id="270" r:id="rId7"/>
-    <p:sldId id="272" r:id="rId8"/>
-    <p:sldId id="261" r:id="rId9"/>
-    <p:sldId id="265" r:id="rId10"/>
-    <p:sldId id="267" r:id="rId11"/>
-    <p:sldId id="274" r:id="rId12"/>
-    <p:sldId id="275" r:id="rId13"/>
+    <p:sldId id="274" r:id="rId4"/>
+    <p:sldId id="265" r:id="rId5"/>
+    <p:sldId id="269" r:id="rId6"/>
+    <p:sldId id="268" r:id="rId7"/>
+    <p:sldId id="271" r:id="rId8"/>
+    <p:sldId id="270" r:id="rId9"/>
+    <p:sldId id="272" r:id="rId10"/>
+    <p:sldId id="276" r:id="rId11"/>
+    <p:sldId id="275" r:id="rId12"/>
   </p:sldIdLst>
   <p:sldSz cx="12192000" cy="6858000"/>
   <p:notesSz cx="6858000" cy="9144000"/>
@@ -117,7 +116,7 @@
   </p:defaultTextStyle>
   <p:extLst>
     <p:ext uri="{EFAFB233-063F-42B5-8137-9DF3F51BA10A}">
-      <p15:sldGuideLst xmlns:p15="http://schemas.microsoft.com/office/powerpoint/2012/main">
+      <p15:sldGuideLst xmlns="" xmlns:p15="http://schemas.microsoft.com/office/powerpoint/2012/main">
         <p15:guide id="1" orient="horz" pos="2160" userDrawn="1">
           <p15:clr>
             <a:srgbClr val="A4A3A4"/>
@@ -132,1421 +131,6 @@
     </p:ext>
   </p:extLst>
 </p:presentation>
-</file>
-
-<file path=ppt/charts/chart1.xml><?xml version="1.0" encoding="utf-8"?>
-<c:chartSpace xmlns:c="http://schemas.openxmlformats.org/drawingml/2006/chart" xmlns:a="http://schemas.openxmlformats.org/drawingml/2006/main" xmlns:r="http://schemas.openxmlformats.org/officeDocument/2006/relationships">
-  <c:date1904 val="0"/>
-  <c:lang val="en-US"/>
-  <c:roundedCorners val="0"/>
-  <mc:AlternateContent xmlns:mc="http://schemas.openxmlformats.org/markup-compatibility/2006">
-    <mc:Choice xmlns:c14="http://schemas.microsoft.com/office/drawing/2007/8/2/chart" Requires="c14">
-      <c14:style val="102"/>
-    </mc:Choice>
-    <mc:Fallback>
-      <c:style val="2"/>
-    </mc:Fallback>
-  </mc:AlternateContent>
-  <c:pivotSource>
-    <c:name>[results_analysis.xlsx]pt_regularization!PivotTable1</c:name>
-    <c:fmtId val="13"/>
-  </c:pivotSource>
-  <c:chart>
-    <c:title>
-      <c:tx>
-        <c:rich>
-          <a:bodyPr rot="0" spcFirstLastPara="1" vertOverflow="ellipsis" vert="horz" wrap="square" anchor="ctr" anchorCtr="1"/>
-          <a:lstStyle/>
-          <a:p>
-            <a:pPr>
-              <a:defRPr sz="1600" b="1" i="0" u="none" strike="noStrike" kern="1200" cap="none" spc="0" normalizeH="0" baseline="0">
-                <a:solidFill>
-                  <a:schemeClr val="dk1">
-                    <a:lumMod val="50000"/>
-                    <a:lumOff val="50000"/>
-                  </a:schemeClr>
-                </a:solidFill>
-                <a:latin typeface="+mj-lt"/>
-                <a:ea typeface="+mj-ea"/>
-                <a:cs typeface="+mj-cs"/>
-              </a:defRPr>
-            </a:pPr>
-            <a:r>
-              <a:rPr lang="en-US"/>
-              <a:t>Regularization </a:t>
-            </a:r>
-            <a:r>
-              <a:rPr lang="en-US" baseline="0"/>
-              <a:t>RMSE</a:t>
-            </a:r>
-            <a:endParaRPr lang="en-US"/>
-          </a:p>
-        </c:rich>
-      </c:tx>
-      <c:layout/>
-      <c:overlay val="0"/>
-      <c:spPr>
-        <a:noFill/>
-        <a:ln>
-          <a:noFill/>
-        </a:ln>
-        <a:effectLst/>
-      </c:spPr>
-      <c:txPr>
-        <a:bodyPr rot="0" spcFirstLastPara="1" vertOverflow="ellipsis" vert="horz" wrap="square" anchor="ctr" anchorCtr="1"/>
-        <a:lstStyle/>
-        <a:p>
-          <a:pPr>
-            <a:defRPr sz="1600" b="1" i="0" u="none" strike="noStrike" kern="1200" cap="none" spc="0" normalizeH="0" baseline="0">
-              <a:solidFill>
-                <a:schemeClr val="dk1">
-                  <a:lumMod val="50000"/>
-                  <a:lumOff val="50000"/>
-                </a:schemeClr>
-              </a:solidFill>
-              <a:latin typeface="+mj-lt"/>
-              <a:ea typeface="+mj-ea"/>
-              <a:cs typeface="+mj-cs"/>
-            </a:defRPr>
-          </a:pPr>
-          <a:endParaRPr lang="en-US"/>
-        </a:p>
-      </c:txPr>
-    </c:title>
-    <c:autoTitleDeleted val="0"/>
-    <c:pivotFmts>
-      <c:pivotFmt>
-        <c:idx val="0"/>
-      </c:pivotFmt>
-      <c:pivotFmt>
-        <c:idx val="1"/>
-      </c:pivotFmt>
-      <c:pivotFmt>
-        <c:idx val="2"/>
-      </c:pivotFmt>
-      <c:pivotFmt>
-        <c:idx val="3"/>
-      </c:pivotFmt>
-      <c:pivotFmt>
-        <c:idx val="4"/>
-      </c:pivotFmt>
-      <c:pivotFmt>
-        <c:idx val="5"/>
-      </c:pivotFmt>
-      <c:pivotFmt>
-        <c:idx val="6"/>
-        <c:spPr>
-          <a:solidFill>
-            <a:schemeClr val="accent1"/>
-          </a:solidFill>
-          <a:ln w="22225" cap="rnd">
-            <a:solidFill>
-              <a:schemeClr val="accent1"/>
-            </a:solidFill>
-            <a:round/>
-          </a:ln>
-          <a:effectLst/>
-        </c:spPr>
-        <c:marker>
-          <c:symbol val="circle"/>
-          <c:size val="6"/>
-          <c:spPr>
-            <a:solidFill>
-              <a:schemeClr val="lt1"/>
-            </a:solidFill>
-            <a:ln w="15875">
-              <a:solidFill>
-                <a:schemeClr val="accent1"/>
-              </a:solidFill>
-              <a:round/>
-            </a:ln>
-            <a:effectLst/>
-          </c:spPr>
-        </c:marker>
-      </c:pivotFmt>
-      <c:pivotFmt>
-        <c:idx val="7"/>
-        <c:spPr>
-          <a:solidFill>
-            <a:schemeClr val="accent1"/>
-          </a:solidFill>
-          <a:ln w="22225" cap="rnd">
-            <a:solidFill>
-              <a:schemeClr val="accent1"/>
-            </a:solidFill>
-            <a:round/>
-          </a:ln>
-          <a:effectLst/>
-        </c:spPr>
-        <c:marker>
-          <c:symbol val="circle"/>
-          <c:size val="6"/>
-          <c:spPr>
-            <a:solidFill>
-              <a:schemeClr val="lt1"/>
-            </a:solidFill>
-            <a:ln w="15875">
-              <a:solidFill>
-                <a:schemeClr val="accent2"/>
-              </a:solidFill>
-              <a:round/>
-            </a:ln>
-            <a:effectLst/>
-          </c:spPr>
-        </c:marker>
-      </c:pivotFmt>
-      <c:pivotFmt>
-        <c:idx val="8"/>
-        <c:spPr>
-          <a:solidFill>
-            <a:schemeClr val="accent1"/>
-          </a:solidFill>
-          <a:ln w="22225" cap="rnd">
-            <a:solidFill>
-              <a:schemeClr val="accent1"/>
-            </a:solidFill>
-            <a:round/>
-          </a:ln>
-          <a:effectLst/>
-        </c:spPr>
-        <c:marker>
-          <c:symbol val="circle"/>
-          <c:size val="6"/>
-          <c:spPr>
-            <a:solidFill>
-              <a:schemeClr val="lt1"/>
-            </a:solidFill>
-            <a:ln w="15875">
-              <a:solidFill>
-                <a:schemeClr val="accent1"/>
-              </a:solidFill>
-              <a:round/>
-            </a:ln>
-            <a:effectLst/>
-          </c:spPr>
-        </c:marker>
-      </c:pivotFmt>
-      <c:pivotFmt>
-        <c:idx val="9"/>
-        <c:spPr>
-          <a:solidFill>
-            <a:schemeClr val="accent1"/>
-          </a:solidFill>
-          <a:ln w="22225" cap="rnd">
-            <a:solidFill>
-              <a:schemeClr val="accent1"/>
-            </a:solidFill>
-            <a:round/>
-          </a:ln>
-          <a:effectLst/>
-        </c:spPr>
-        <c:marker>
-          <c:symbol val="circle"/>
-          <c:size val="6"/>
-          <c:spPr>
-            <a:solidFill>
-              <a:schemeClr val="lt1"/>
-            </a:solidFill>
-            <a:ln w="15875">
-              <a:solidFill>
-                <a:schemeClr val="accent2"/>
-              </a:solidFill>
-              <a:round/>
-            </a:ln>
-            <a:effectLst/>
-          </c:spPr>
-        </c:marker>
-      </c:pivotFmt>
-      <c:pivotFmt>
-        <c:idx val="10"/>
-        <c:spPr>
-          <a:solidFill>
-            <a:schemeClr val="accent1"/>
-          </a:solidFill>
-          <a:ln w="22225" cap="rnd">
-            <a:solidFill>
-              <a:schemeClr val="accent1"/>
-            </a:solidFill>
-            <a:round/>
-          </a:ln>
-          <a:effectLst/>
-        </c:spPr>
-        <c:marker>
-          <c:symbol val="circle"/>
-          <c:size val="6"/>
-          <c:spPr>
-            <a:solidFill>
-              <a:schemeClr val="lt1"/>
-            </a:solidFill>
-            <a:ln w="15875">
-              <a:solidFill>
-                <a:schemeClr val="accent1"/>
-              </a:solidFill>
-              <a:round/>
-            </a:ln>
-            <a:effectLst/>
-          </c:spPr>
-        </c:marker>
-      </c:pivotFmt>
-      <c:pivotFmt>
-        <c:idx val="11"/>
-        <c:spPr>
-          <a:solidFill>
-            <a:schemeClr val="accent1"/>
-          </a:solidFill>
-          <a:ln w="22225" cap="rnd">
-            <a:solidFill>
-              <a:schemeClr val="accent1"/>
-            </a:solidFill>
-            <a:round/>
-          </a:ln>
-          <a:effectLst/>
-        </c:spPr>
-        <c:marker>
-          <c:symbol val="circle"/>
-          <c:size val="6"/>
-          <c:spPr>
-            <a:solidFill>
-              <a:schemeClr val="lt1"/>
-            </a:solidFill>
-            <a:ln w="15875">
-              <a:solidFill>
-                <a:schemeClr val="accent2"/>
-              </a:solidFill>
-              <a:round/>
-            </a:ln>
-            <a:effectLst/>
-          </c:spPr>
-        </c:marker>
-      </c:pivotFmt>
-    </c:pivotFmts>
-    <c:plotArea>
-      <c:layout/>
-      <c:lineChart>
-        <c:grouping val="standard"/>
-        <c:varyColors val="0"/>
-        <c:ser>
-          <c:idx val="0"/>
-          <c:order val="0"/>
-          <c:tx>
-            <c:strRef>
-              <c:f>pt_regularization!$B$3:$B$4</c:f>
-              <c:strCache>
-                <c:ptCount val="1"/>
-                <c:pt idx="0">
-                  <c:v>FALSE</c:v>
-                </c:pt>
-              </c:strCache>
-            </c:strRef>
-          </c:tx>
-          <c:spPr>
-            <a:ln w="22225" cap="rnd">
-              <a:solidFill>
-                <a:schemeClr val="accent1"/>
-              </a:solidFill>
-              <a:round/>
-            </a:ln>
-            <a:effectLst/>
-          </c:spPr>
-          <c:marker>
-            <c:symbol val="circle"/>
-            <c:size val="6"/>
-            <c:spPr>
-              <a:solidFill>
-                <a:schemeClr val="lt1"/>
-              </a:solidFill>
-              <a:ln w="15875">
-                <a:solidFill>
-                  <a:schemeClr val="accent1"/>
-                </a:solidFill>
-                <a:round/>
-              </a:ln>
-              <a:effectLst/>
-            </c:spPr>
-          </c:marker>
-          <c:cat>
-            <c:strRef>
-              <c:f>pt_regularization!$A$5:$A$11</c:f>
-              <c:strCache>
-                <c:ptCount val="6"/>
-                <c:pt idx="0">
-                  <c:v>10000</c:v>
-                </c:pt>
-                <c:pt idx="1">
-                  <c:v>50000</c:v>
-                </c:pt>
-                <c:pt idx="2">
-                  <c:v>100000</c:v>
-                </c:pt>
-                <c:pt idx="3">
-                  <c:v>500000</c:v>
-                </c:pt>
-                <c:pt idx="4">
-                  <c:v>1000000</c:v>
-                </c:pt>
-                <c:pt idx="5">
-                  <c:v>1458645</c:v>
-                </c:pt>
-              </c:strCache>
-            </c:strRef>
-          </c:cat>
-          <c:val>
-            <c:numRef>
-              <c:f>pt_regularization!$B$5:$B$11</c:f>
-              <c:numCache>
-                <c:formatCode>General</c:formatCode>
-                <c:ptCount val="6"/>
-                <c:pt idx="0">
-                  <c:v>2782.0849509999998</c:v>
-                </c:pt>
-                <c:pt idx="1">
-                  <c:v>3522.3794975000001</c:v>
-                </c:pt>
-                <c:pt idx="2">
-                  <c:v>3117.1964233999997</c:v>
-                </c:pt>
-                <c:pt idx="3">
-                  <c:v>3248.7347595000001</c:v>
-                </c:pt>
-                <c:pt idx="4">
-                  <c:v>3260.1629929999999</c:v>
-                </c:pt>
-                <c:pt idx="5">
-                  <c:v>6187.3338490000006</c:v>
-                </c:pt>
-              </c:numCache>
-            </c:numRef>
-          </c:val>
-          <c:smooth val="0"/>
-        </c:ser>
-        <c:ser>
-          <c:idx val="1"/>
-          <c:order val="1"/>
-          <c:tx>
-            <c:strRef>
-              <c:f>pt_regularization!$C$3:$C$4</c:f>
-              <c:strCache>
-                <c:ptCount val="1"/>
-                <c:pt idx="0">
-                  <c:v>TRUE</c:v>
-                </c:pt>
-              </c:strCache>
-            </c:strRef>
-          </c:tx>
-          <c:spPr>
-            <a:ln w="22225" cap="rnd">
-              <a:solidFill>
-                <a:schemeClr val="accent2"/>
-              </a:solidFill>
-              <a:round/>
-            </a:ln>
-            <a:effectLst/>
-          </c:spPr>
-          <c:marker>
-            <c:symbol val="circle"/>
-            <c:size val="6"/>
-            <c:spPr>
-              <a:solidFill>
-                <a:srgbClr val="EE9D65"/>
-              </a:solidFill>
-              <a:ln w="15875">
-                <a:solidFill>
-                  <a:schemeClr val="accent2"/>
-                </a:solidFill>
-                <a:round/>
-              </a:ln>
-              <a:effectLst/>
-            </c:spPr>
-          </c:marker>
-          <c:cat>
-            <c:strRef>
-              <c:f>pt_regularization!$A$5:$A$11</c:f>
-              <c:strCache>
-                <c:ptCount val="6"/>
-                <c:pt idx="0">
-                  <c:v>10000</c:v>
-                </c:pt>
-                <c:pt idx="1">
-                  <c:v>50000</c:v>
-                </c:pt>
-                <c:pt idx="2">
-                  <c:v>100000</c:v>
-                </c:pt>
-                <c:pt idx="3">
-                  <c:v>500000</c:v>
-                </c:pt>
-                <c:pt idx="4">
-                  <c:v>1000000</c:v>
-                </c:pt>
-                <c:pt idx="5">
-                  <c:v>1458645</c:v>
-                </c:pt>
-              </c:strCache>
-            </c:strRef>
-          </c:cat>
-          <c:val>
-            <c:numRef>
-              <c:f>pt_regularization!$C$5:$C$11</c:f>
-              <c:numCache>
-                <c:formatCode>General</c:formatCode>
-                <c:ptCount val="6"/>
-                <c:pt idx="1">
-                  <c:v>3191.5571558000001</c:v>
-                </c:pt>
-                <c:pt idx="2">
-                  <c:v>2970.6215604999998</c:v>
-                </c:pt>
-                <c:pt idx="3">
-                  <c:v>6867.552291</c:v>
-                </c:pt>
-                <c:pt idx="5">
-                  <c:v>3176.1488141158402</c:v>
-                </c:pt>
-              </c:numCache>
-            </c:numRef>
-          </c:val>
-          <c:smooth val="0"/>
-        </c:ser>
-        <c:dLbls>
-          <c:showLegendKey val="0"/>
-          <c:showVal val="0"/>
-          <c:showCatName val="0"/>
-          <c:showSerName val="0"/>
-          <c:showPercent val="0"/>
-          <c:showBubbleSize val="0"/>
-        </c:dLbls>
-        <c:dropLines>
-          <c:spPr>
-            <a:ln w="9525" cap="flat" cmpd="sng" algn="ctr">
-              <a:solidFill>
-                <a:schemeClr val="dk1">
-                  <a:lumMod val="35000"/>
-                  <a:lumOff val="65000"/>
-                </a:schemeClr>
-              </a:solidFill>
-              <a:round/>
-            </a:ln>
-            <a:effectLst/>
-          </c:spPr>
-        </c:dropLines>
-        <c:marker val="1"/>
-        <c:smooth val="0"/>
-        <c:axId val="334539688"/>
-        <c:axId val="334539296"/>
-      </c:lineChart>
-      <c:catAx>
-        <c:axId val="334539688"/>
-        <c:scaling>
-          <c:orientation val="minMax"/>
-        </c:scaling>
-        <c:delete val="0"/>
-        <c:axPos val="b"/>
-        <c:title>
-          <c:tx>
-            <c:rich>
-              <a:bodyPr rot="0" spcFirstLastPara="1" vertOverflow="ellipsis" vert="horz" wrap="square" anchor="ctr" anchorCtr="1"/>
-              <a:lstStyle/>
-              <a:p>
-                <a:pPr>
-                  <a:defRPr sz="900" b="1" i="0" u="none" strike="noStrike" kern="1200" baseline="0">
-                    <a:solidFill>
-                      <a:schemeClr val="dk1">
-                        <a:lumMod val="65000"/>
-                        <a:lumOff val="35000"/>
-                      </a:schemeClr>
-                    </a:solidFill>
-                    <a:latin typeface="+mn-lt"/>
-                    <a:ea typeface="+mn-ea"/>
-                    <a:cs typeface="+mn-cs"/>
-                  </a:defRPr>
-                </a:pPr>
-                <a:r>
-                  <a:rPr lang="en-US"/>
-                  <a:t>Number of Obserations</a:t>
-                </a:r>
-                <a:r>
-                  <a:rPr lang="en-US" baseline="0"/>
-                  <a:t> (Test and Training)</a:t>
-                </a:r>
-                <a:r>
-                  <a:rPr lang="en-US"/>
-                  <a:t> </a:t>
-                </a:r>
-              </a:p>
-            </c:rich>
-          </c:tx>
-          <c:layout/>
-          <c:overlay val="0"/>
-          <c:spPr>
-            <a:noFill/>
-            <a:ln>
-              <a:noFill/>
-            </a:ln>
-            <a:effectLst/>
-          </c:spPr>
-          <c:txPr>
-            <a:bodyPr rot="0" spcFirstLastPara="1" vertOverflow="ellipsis" vert="horz" wrap="square" anchor="ctr" anchorCtr="1"/>
-            <a:lstStyle/>
-            <a:p>
-              <a:pPr>
-                <a:defRPr sz="900" b="1" i="0" u="none" strike="noStrike" kern="1200" baseline="0">
-                  <a:solidFill>
-                    <a:schemeClr val="dk1">
-                      <a:lumMod val="65000"/>
-                      <a:lumOff val="35000"/>
-                    </a:schemeClr>
-                  </a:solidFill>
-                  <a:latin typeface="+mn-lt"/>
-                  <a:ea typeface="+mn-ea"/>
-                  <a:cs typeface="+mn-cs"/>
-                </a:defRPr>
-              </a:pPr>
-              <a:endParaRPr lang="en-US"/>
-            </a:p>
-          </c:txPr>
-        </c:title>
-        <c:numFmt formatCode="General" sourceLinked="1"/>
-        <c:majorTickMark val="none"/>
-        <c:minorTickMark val="none"/>
-        <c:tickLblPos val="nextTo"/>
-        <c:spPr>
-          <a:noFill/>
-          <a:ln w="9525" cap="flat" cmpd="sng" algn="ctr">
-            <a:solidFill>
-              <a:schemeClr val="dk1">
-                <a:lumMod val="15000"/>
-                <a:lumOff val="85000"/>
-              </a:schemeClr>
-            </a:solidFill>
-            <a:round/>
-          </a:ln>
-          <a:effectLst/>
-        </c:spPr>
-        <c:txPr>
-          <a:bodyPr rot="-60000000" spcFirstLastPara="1" vertOverflow="ellipsis" vert="horz" wrap="square" anchor="ctr" anchorCtr="1"/>
-          <a:lstStyle/>
-          <a:p>
-            <a:pPr>
-              <a:defRPr sz="900" b="0" i="0" u="none" strike="noStrike" kern="1200" cap="none" spc="0" normalizeH="0" baseline="0">
-                <a:solidFill>
-                  <a:schemeClr val="dk1">
-                    <a:lumMod val="65000"/>
-                    <a:lumOff val="35000"/>
-                  </a:schemeClr>
-                </a:solidFill>
-                <a:latin typeface="+mn-lt"/>
-                <a:ea typeface="+mn-ea"/>
-                <a:cs typeface="+mn-cs"/>
-              </a:defRPr>
-            </a:pPr>
-            <a:endParaRPr lang="en-US"/>
-          </a:p>
-        </c:txPr>
-        <c:crossAx val="334539296"/>
-        <c:crosses val="autoZero"/>
-        <c:auto val="1"/>
-        <c:lblAlgn val="ctr"/>
-        <c:lblOffset val="100"/>
-        <c:noMultiLvlLbl val="0"/>
-      </c:catAx>
-      <c:valAx>
-        <c:axId val="334539296"/>
-        <c:scaling>
-          <c:orientation val="minMax"/>
-        </c:scaling>
-        <c:delete val="0"/>
-        <c:axPos val="l"/>
-        <c:majorGridlines>
-          <c:spPr>
-            <a:ln w="9525" cap="flat" cmpd="sng" algn="ctr">
-              <a:solidFill>
-                <a:schemeClr val="dk1">
-                  <a:lumMod val="15000"/>
-                  <a:lumOff val="85000"/>
-                  <a:alpha val="54000"/>
-                </a:schemeClr>
-              </a:solidFill>
-              <a:round/>
-            </a:ln>
-            <a:effectLst/>
-          </c:spPr>
-        </c:majorGridlines>
-        <c:title>
-          <c:tx>
-            <c:rich>
-              <a:bodyPr rot="-5400000" spcFirstLastPara="1" vertOverflow="ellipsis" vert="horz" wrap="square" anchor="ctr" anchorCtr="1"/>
-              <a:lstStyle/>
-              <a:p>
-                <a:pPr>
-                  <a:defRPr sz="900" b="1" i="0" u="none" strike="noStrike" kern="1200" baseline="0">
-                    <a:solidFill>
-                      <a:schemeClr val="dk1">
-                        <a:lumMod val="65000"/>
-                        <a:lumOff val="35000"/>
-                      </a:schemeClr>
-                    </a:solidFill>
-                    <a:latin typeface="+mn-lt"/>
-                    <a:ea typeface="+mn-ea"/>
-                    <a:cs typeface="+mn-cs"/>
-                  </a:defRPr>
-                </a:pPr>
-                <a:r>
-                  <a:rPr lang="en-US"/>
-                  <a:t>RMSE</a:t>
-                </a:r>
-              </a:p>
-            </c:rich>
-          </c:tx>
-          <c:layout/>
-          <c:overlay val="0"/>
-          <c:spPr>
-            <a:noFill/>
-            <a:ln>
-              <a:noFill/>
-            </a:ln>
-            <a:effectLst/>
-          </c:spPr>
-          <c:txPr>
-            <a:bodyPr rot="-5400000" spcFirstLastPara="1" vertOverflow="ellipsis" vert="horz" wrap="square" anchor="ctr" anchorCtr="1"/>
-            <a:lstStyle/>
-            <a:p>
-              <a:pPr>
-                <a:defRPr sz="900" b="1" i="0" u="none" strike="noStrike" kern="1200" baseline="0">
-                  <a:solidFill>
-                    <a:schemeClr val="dk1">
-                      <a:lumMod val="65000"/>
-                      <a:lumOff val="35000"/>
-                    </a:schemeClr>
-                  </a:solidFill>
-                  <a:latin typeface="+mn-lt"/>
-                  <a:ea typeface="+mn-ea"/>
-                  <a:cs typeface="+mn-cs"/>
-                </a:defRPr>
-              </a:pPr>
-              <a:endParaRPr lang="en-US"/>
-            </a:p>
-          </c:txPr>
-        </c:title>
-        <c:numFmt formatCode="General" sourceLinked="1"/>
-        <c:majorTickMark val="out"/>
-        <c:minorTickMark val="none"/>
-        <c:tickLblPos val="nextTo"/>
-        <c:spPr>
-          <a:noFill/>
-          <a:ln>
-            <a:noFill/>
-          </a:ln>
-          <a:effectLst/>
-        </c:spPr>
-        <c:txPr>
-          <a:bodyPr rot="-60000000" spcFirstLastPara="1" vertOverflow="ellipsis" vert="horz" wrap="square" anchor="ctr" anchorCtr="1"/>
-          <a:lstStyle/>
-          <a:p>
-            <a:pPr>
-              <a:defRPr sz="900" b="0" i="0" u="none" strike="noStrike" kern="1200" baseline="0">
-                <a:solidFill>
-                  <a:schemeClr val="dk1">
-                    <a:lumMod val="65000"/>
-                    <a:lumOff val="35000"/>
-                  </a:schemeClr>
-                </a:solidFill>
-                <a:latin typeface="+mn-lt"/>
-                <a:ea typeface="+mn-ea"/>
-                <a:cs typeface="+mn-cs"/>
-              </a:defRPr>
-            </a:pPr>
-            <a:endParaRPr lang="en-US"/>
-          </a:p>
-        </c:txPr>
-        <c:crossAx val="334539688"/>
-        <c:crosses val="autoZero"/>
-        <c:crossBetween val="between"/>
-      </c:valAx>
-      <c:spPr>
-        <a:pattFill prst="ltDnDiag">
-          <a:fgClr>
-            <a:schemeClr val="dk1">
-              <a:lumMod val="15000"/>
-              <a:lumOff val="85000"/>
-            </a:schemeClr>
-          </a:fgClr>
-          <a:bgClr>
-            <a:schemeClr val="lt1"/>
-          </a:bgClr>
-        </a:pattFill>
-        <a:ln>
-          <a:noFill/>
-        </a:ln>
-        <a:effectLst/>
-      </c:spPr>
-    </c:plotArea>
-    <c:legend>
-      <c:legendPos val="r"/>
-      <c:layout/>
-      <c:overlay val="0"/>
-      <c:spPr>
-        <a:noFill/>
-        <a:ln>
-          <a:noFill/>
-        </a:ln>
-        <a:effectLst/>
-      </c:spPr>
-      <c:txPr>
-        <a:bodyPr rot="0" spcFirstLastPara="1" vertOverflow="ellipsis" vert="horz" wrap="square" anchor="ctr" anchorCtr="1"/>
-        <a:lstStyle/>
-        <a:p>
-          <a:pPr>
-            <a:defRPr sz="900" b="0" i="0" u="none" strike="noStrike" kern="1200" baseline="0">
-              <a:solidFill>
-                <a:schemeClr val="dk1">
-                  <a:lumMod val="65000"/>
-                  <a:lumOff val="35000"/>
-                </a:schemeClr>
-              </a:solidFill>
-              <a:latin typeface="+mn-lt"/>
-              <a:ea typeface="+mn-ea"/>
-              <a:cs typeface="+mn-cs"/>
-            </a:defRPr>
-          </a:pPr>
-          <a:endParaRPr lang="en-US"/>
-        </a:p>
-      </c:txPr>
-    </c:legend>
-    <c:plotVisOnly val="1"/>
-    <c:dispBlanksAs val="gap"/>
-    <c:showDLblsOverMax val="0"/>
-  </c:chart>
-  <c:spPr>
-    <a:solidFill>
-      <a:schemeClr val="lt1"/>
-    </a:solidFill>
-    <a:ln w="9525" cap="flat" cmpd="sng" algn="ctr">
-      <a:solidFill>
-        <a:schemeClr val="dk1">
-          <a:lumMod val="15000"/>
-          <a:lumOff val="85000"/>
-        </a:schemeClr>
-      </a:solidFill>
-      <a:round/>
-    </a:ln>
-    <a:effectLst/>
-  </c:spPr>
-  <c:txPr>
-    <a:bodyPr/>
-    <a:lstStyle/>
-    <a:p>
-      <a:pPr>
-        <a:defRPr/>
-      </a:pPr>
-      <a:endParaRPr lang="en-US"/>
-    </a:p>
-  </c:txPr>
-  <c:externalData r:id="rId3">
-    <c:autoUpdate val="0"/>
-  </c:externalData>
-  <c:extLst>
-    <c:ext xmlns:c14="http://schemas.microsoft.com/office/drawing/2007/8/2/chart" uri="{781A3756-C4B2-4CAC-9D66-4F8BD8637D16}">
-      <c14:pivotOptions>
-        <c14:dropZoneFilter val="1"/>
-        <c14:dropZoneCategories val="1"/>
-        <c14:dropZoneData val="1"/>
-        <c14:dropZoneSeries val="1"/>
-        <c14:dropZonesVisible val="1"/>
-      </c14:pivotOptions>
-    </c:ext>
-  </c:extLst>
-</c:chartSpace>
-</file>
-
-<file path=ppt/charts/colors1.xml><?xml version="1.0" encoding="utf-8"?>
-<cs:colorStyle xmlns:cs="http://schemas.microsoft.com/office/drawing/2012/chartStyle" xmlns:a="http://schemas.openxmlformats.org/drawingml/2006/main" meth="cycle" id="10">
-  <a:schemeClr val="accent1"/>
-  <a:schemeClr val="accent2"/>
-  <a:schemeClr val="accent3"/>
-  <a:schemeClr val="accent4"/>
-  <a:schemeClr val="accent5"/>
-  <a:schemeClr val="accent6"/>
-  <cs:variation/>
-  <cs:variation>
-    <a:lumMod val="60000"/>
-  </cs:variation>
-  <cs:variation>
-    <a:lumMod val="80000"/>
-    <a:lumOff val="20000"/>
-  </cs:variation>
-  <cs:variation>
-    <a:lumMod val="80000"/>
-  </cs:variation>
-  <cs:variation>
-    <a:lumMod val="60000"/>
-    <a:lumOff val="40000"/>
-  </cs:variation>
-  <cs:variation>
-    <a:lumMod val="50000"/>
-  </cs:variation>
-  <cs:variation>
-    <a:lumMod val="70000"/>
-    <a:lumOff val="30000"/>
-  </cs:variation>
-  <cs:variation>
-    <a:lumMod val="70000"/>
-  </cs:variation>
-  <cs:variation>
-    <a:lumMod val="50000"/>
-    <a:lumOff val="50000"/>
-  </cs:variation>
-</cs:colorStyle>
-</file>
-
-<file path=ppt/charts/style1.xml><?xml version="1.0" encoding="utf-8"?>
-<cs:chartStyle xmlns:cs="http://schemas.microsoft.com/office/drawing/2012/chartStyle" xmlns:a="http://schemas.openxmlformats.org/drawingml/2006/main" id="232">
-  <cs:axisTitle>
-    <cs:lnRef idx="0"/>
-    <cs:fillRef idx="0"/>
-    <cs:effectRef idx="0"/>
-    <cs:fontRef idx="minor">
-      <a:schemeClr val="dk1">
-        <a:lumMod val="65000"/>
-        <a:lumOff val="35000"/>
-      </a:schemeClr>
-    </cs:fontRef>
-    <cs:defRPr sz="900" b="1" kern="1200"/>
-  </cs:axisTitle>
-  <cs:categoryAxis>
-    <cs:lnRef idx="0"/>
-    <cs:fillRef idx="0"/>
-    <cs:effectRef idx="0"/>
-    <cs:fontRef idx="minor">
-      <a:schemeClr val="dk1">
-        <a:lumMod val="65000"/>
-        <a:lumOff val="35000"/>
-      </a:schemeClr>
-    </cs:fontRef>
-    <cs:spPr>
-      <a:ln w="9525" cap="flat" cmpd="sng" algn="ctr">
-        <a:solidFill>
-          <a:schemeClr val="dk1">
-            <a:lumMod val="15000"/>
-            <a:lumOff val="85000"/>
-          </a:schemeClr>
-        </a:solidFill>
-        <a:round/>
-      </a:ln>
-    </cs:spPr>
-    <cs:defRPr sz="900" kern="1200" cap="none" spc="0" normalizeH="0" baseline="0"/>
-  </cs:categoryAxis>
-  <cs:chartArea>
-    <cs:lnRef idx="0"/>
-    <cs:fillRef idx="0"/>
-    <cs:effectRef idx="0"/>
-    <cs:fontRef idx="minor">
-      <a:schemeClr val="dk1"/>
-    </cs:fontRef>
-    <cs:spPr>
-      <a:solidFill>
-        <a:schemeClr val="lt1"/>
-      </a:solidFill>
-      <a:ln w="9525" cap="flat" cmpd="sng" algn="ctr">
-        <a:solidFill>
-          <a:schemeClr val="dk1">
-            <a:lumMod val="15000"/>
-            <a:lumOff val="85000"/>
-          </a:schemeClr>
-        </a:solidFill>
-        <a:round/>
-      </a:ln>
-    </cs:spPr>
-    <cs:defRPr sz="900" kern="1200"/>
-  </cs:chartArea>
-  <cs:dataLabel>
-    <cs:lnRef idx="0"/>
-    <cs:fillRef idx="0"/>
-    <cs:effectRef idx="0"/>
-    <cs:fontRef idx="minor">
-      <a:schemeClr val="dk1">
-        <a:lumMod val="75000"/>
-        <a:lumOff val="25000"/>
-      </a:schemeClr>
-    </cs:fontRef>
-    <cs:defRPr sz="900" kern="1200"/>
-  </cs:dataLabel>
-  <cs:dataLabelCallout>
-    <cs:lnRef idx="0"/>
-    <cs:fillRef idx="0"/>
-    <cs:effectRef idx="0"/>
-    <cs:fontRef idx="minor">
-      <a:schemeClr val="dk1">
-        <a:lumMod val="65000"/>
-        <a:lumOff val="35000"/>
-      </a:schemeClr>
-    </cs:fontRef>
-    <cs:spPr>
-      <a:solidFill>
-        <a:schemeClr val="lt1"/>
-      </a:solidFill>
-      <a:ln>
-        <a:solidFill>
-          <a:schemeClr val="dk1">
-            <a:lumMod val="25000"/>
-            <a:lumOff val="75000"/>
-          </a:schemeClr>
-        </a:solidFill>
-      </a:ln>
-    </cs:spPr>
-    <cs:defRPr sz="900" kern="1200"/>
-    <cs:bodyPr rot="0" spcFirstLastPara="1" vertOverflow="clip" horzOverflow="clip" vert="horz" wrap="square" lIns="36576" tIns="18288" rIns="36576" bIns="18288" anchor="ctr" anchorCtr="1">
-      <a:spAutoFit/>
-    </cs:bodyPr>
-  </cs:dataLabelCallout>
-  <cs:dataPoint>
-    <cs:lnRef idx="0"/>
-    <cs:fillRef idx="0">
-      <cs:styleClr val="auto"/>
-    </cs:fillRef>
-    <cs:effectRef idx="0"/>
-    <cs:fontRef idx="minor">
-      <a:schemeClr val="dk1"/>
-    </cs:fontRef>
-    <cs:spPr>
-      <a:solidFill>
-        <a:schemeClr val="phClr"/>
-      </a:solidFill>
-    </cs:spPr>
-  </cs:dataPoint>
-  <cs:dataPoint3D>
-    <cs:lnRef idx="0"/>
-    <cs:fillRef idx="0">
-      <cs:styleClr val="auto"/>
-    </cs:fillRef>
-    <cs:effectRef idx="0"/>
-    <cs:fontRef idx="minor">
-      <a:schemeClr val="dk1"/>
-    </cs:fontRef>
-    <cs:spPr>
-      <a:solidFill>
-        <a:schemeClr val="phClr"/>
-      </a:solidFill>
-    </cs:spPr>
-  </cs:dataPoint3D>
-  <cs:dataPointLine>
-    <cs:lnRef idx="0">
-      <cs:styleClr val="auto"/>
-    </cs:lnRef>
-    <cs:fillRef idx="0"/>
-    <cs:effectRef idx="0"/>
-    <cs:fontRef idx="minor">
-      <a:schemeClr val="dk1"/>
-    </cs:fontRef>
-    <cs:spPr>
-      <a:ln w="22225" cap="rnd">
-        <a:solidFill>
-          <a:schemeClr val="phClr"/>
-        </a:solidFill>
-        <a:round/>
-      </a:ln>
-    </cs:spPr>
-  </cs:dataPointLine>
-  <cs:dataPointMarker>
-    <cs:lnRef idx="0">
-      <cs:styleClr val="auto"/>
-    </cs:lnRef>
-    <cs:fillRef idx="0">
-      <cs:styleClr val="auto"/>
-    </cs:fillRef>
-    <cs:effectRef idx="0"/>
-    <cs:fontRef idx="minor">
-      <a:schemeClr val="dk1"/>
-    </cs:fontRef>
-    <cs:spPr>
-      <a:solidFill>
-        <a:schemeClr val="lt1"/>
-      </a:solidFill>
-      <a:ln w="15875">
-        <a:solidFill>
-          <a:schemeClr val="phClr"/>
-        </a:solidFill>
-        <a:round/>
-      </a:ln>
-    </cs:spPr>
-  </cs:dataPointMarker>
-  <cs:dataPointMarkerLayout symbol="circle" size="6"/>
-  <cs:dataPointWireframe>
-    <cs:lnRef idx="0">
-      <cs:styleClr val="auto"/>
-    </cs:lnRef>
-    <cs:fillRef idx="0"/>
-    <cs:effectRef idx="0"/>
-    <cs:fontRef idx="minor">
-      <a:schemeClr val="dk1"/>
-    </cs:fontRef>
-    <cs:spPr>
-      <a:ln w="9525" cap="rnd">
-        <a:solidFill>
-          <a:schemeClr val="phClr"/>
-        </a:solidFill>
-        <a:round/>
-      </a:ln>
-    </cs:spPr>
-  </cs:dataPointWireframe>
-  <cs:dataTable>
-    <cs:lnRef idx="0"/>
-    <cs:fillRef idx="0"/>
-    <cs:effectRef idx="0"/>
-    <cs:fontRef idx="minor">
-      <a:schemeClr val="dk1">
-        <a:lumMod val="65000"/>
-        <a:lumOff val="35000"/>
-      </a:schemeClr>
-    </cs:fontRef>
-    <cs:spPr>
-      <a:ln w="9525" cap="flat" cmpd="sng" algn="ctr">
-        <a:solidFill>
-          <a:schemeClr val="dk1">
-            <a:lumMod val="15000"/>
-            <a:lumOff val="85000"/>
-          </a:schemeClr>
-        </a:solidFill>
-        <a:round/>
-      </a:ln>
-    </cs:spPr>
-    <cs:defRPr sz="800" kern="1200"/>
-  </cs:dataTable>
-  <cs:downBar>
-    <cs:lnRef idx="0"/>
-    <cs:fillRef idx="0"/>
-    <cs:effectRef idx="0"/>
-    <cs:fontRef idx="minor">
-      <a:schemeClr val="dk1"/>
-    </cs:fontRef>
-    <cs:spPr>
-      <a:solidFill>
-        <a:schemeClr val="dk1">
-          <a:lumMod val="75000"/>
-          <a:lumOff val="25000"/>
-        </a:schemeClr>
-      </a:solidFill>
-      <a:ln w="9525" cap="flat" cmpd="sng" algn="ctr">
-        <a:solidFill>
-          <a:schemeClr val="dk1">
-            <a:lumMod val="50000"/>
-            <a:lumOff val="50000"/>
-          </a:schemeClr>
-        </a:solidFill>
-        <a:round/>
-      </a:ln>
-    </cs:spPr>
-  </cs:downBar>
-  <cs:dropLine>
-    <cs:lnRef idx="0"/>
-    <cs:fillRef idx="0"/>
-    <cs:effectRef idx="0"/>
-    <cs:fontRef idx="minor">
-      <a:schemeClr val="dk1"/>
-    </cs:fontRef>
-    <cs:spPr>
-      <a:ln w="9525" cap="flat" cmpd="sng" algn="ctr">
-        <a:solidFill>
-          <a:schemeClr val="dk1">
-            <a:lumMod val="35000"/>
-            <a:lumOff val="65000"/>
-          </a:schemeClr>
-        </a:solidFill>
-        <a:round/>
-      </a:ln>
-    </cs:spPr>
-  </cs:dropLine>
-  <cs:errorBar>
-    <cs:lnRef idx="0"/>
-    <cs:fillRef idx="0"/>
-    <cs:effectRef idx="0"/>
-    <cs:fontRef idx="minor">
-      <a:schemeClr val="dk1"/>
-    </cs:fontRef>
-    <cs:spPr>
-      <a:ln w="9525" cap="flat" cmpd="sng" algn="ctr">
-        <a:solidFill>
-          <a:schemeClr val="dk1">
-            <a:lumMod val="50000"/>
-            <a:lumOff val="50000"/>
-          </a:schemeClr>
-        </a:solidFill>
-        <a:round/>
-      </a:ln>
-    </cs:spPr>
-  </cs:errorBar>
-  <cs:floor>
-    <cs:lnRef idx="0"/>
-    <cs:fillRef idx="0"/>
-    <cs:effectRef idx="0"/>
-    <cs:fontRef idx="minor">
-      <a:schemeClr val="dk1"/>
-    </cs:fontRef>
-    <cs:spPr>
-      <a:pattFill prst="ltDnDiag">
-        <a:fgClr>
-          <a:schemeClr val="dk1">
-            <a:lumMod val="15000"/>
-            <a:lumOff val="85000"/>
-          </a:schemeClr>
-        </a:fgClr>
-        <a:bgClr>
-          <a:schemeClr val="lt1"/>
-        </a:bgClr>
-      </a:pattFill>
-    </cs:spPr>
-  </cs:floor>
-  <cs:gridlineMajor>
-    <cs:lnRef idx="0"/>
-    <cs:fillRef idx="0"/>
-    <cs:effectRef idx="0"/>
-    <cs:fontRef idx="minor">
-      <a:schemeClr val="dk1"/>
-    </cs:fontRef>
-    <cs:spPr>
-      <a:ln w="9525" cap="flat" cmpd="sng" algn="ctr">
-        <a:solidFill>
-          <a:schemeClr val="dk1">
-            <a:lumMod val="15000"/>
-            <a:lumOff val="85000"/>
-            <a:alpha val="54000"/>
-          </a:schemeClr>
-        </a:solidFill>
-        <a:round/>
-      </a:ln>
-    </cs:spPr>
-  </cs:gridlineMajor>
-  <cs:gridlineMinor>
-    <cs:lnRef idx="0"/>
-    <cs:fillRef idx="0"/>
-    <cs:effectRef idx="0"/>
-    <cs:fontRef idx="minor">
-      <a:schemeClr val="dk1"/>
-    </cs:fontRef>
-    <cs:spPr>
-      <a:ln w="9525" cap="flat" cmpd="sng" algn="ctr">
-        <a:solidFill>
-          <a:schemeClr val="dk1">
-            <a:lumMod val="15000"/>
-            <a:lumOff val="85000"/>
-            <a:alpha val="51000"/>
-          </a:schemeClr>
-        </a:solidFill>
-        <a:round/>
-      </a:ln>
-    </cs:spPr>
-  </cs:gridlineMinor>
-  <cs:hiLoLine>
-    <cs:lnRef idx="0"/>
-    <cs:fillRef idx="0"/>
-    <cs:effectRef idx="0"/>
-    <cs:fontRef idx="minor">
-      <a:schemeClr val="dk1"/>
-    </cs:fontRef>
-    <cs:spPr>
-      <a:ln w="9525" cap="flat" cmpd="sng" algn="ctr">
-        <a:solidFill>
-          <a:schemeClr val="dk1">
-            <a:lumMod val="35000"/>
-            <a:lumOff val="65000"/>
-          </a:schemeClr>
-        </a:solidFill>
-        <a:round/>
-      </a:ln>
-    </cs:spPr>
-  </cs:hiLoLine>
-  <cs:leaderLine>
-    <cs:lnRef idx="0"/>
-    <cs:fillRef idx="0"/>
-    <cs:effectRef idx="0"/>
-    <cs:fontRef idx="minor">
-      <a:schemeClr val="dk1"/>
-    </cs:fontRef>
-    <cs:spPr>
-      <a:ln w="9525" cap="flat" cmpd="sng" algn="ctr">
-        <a:solidFill>
-          <a:schemeClr val="dk1">
-            <a:lumMod val="35000"/>
-            <a:lumOff val="65000"/>
-          </a:schemeClr>
-        </a:solidFill>
-        <a:round/>
-      </a:ln>
-    </cs:spPr>
-  </cs:leaderLine>
-  <cs:legend>
-    <cs:lnRef idx="0"/>
-    <cs:fillRef idx="0"/>
-    <cs:effectRef idx="0"/>
-    <cs:fontRef idx="minor">
-      <a:schemeClr val="dk1">
-        <a:lumMod val="65000"/>
-        <a:lumOff val="35000"/>
-      </a:schemeClr>
-    </cs:fontRef>
-    <cs:defRPr sz="900" kern="1200"/>
-  </cs:legend>
-  <cs:plotArea>
-    <cs:lnRef idx="0"/>
-    <cs:fillRef idx="0"/>
-    <cs:effectRef idx="0"/>
-    <cs:fontRef idx="minor">
-      <a:schemeClr val="dk1"/>
-    </cs:fontRef>
-    <cs:spPr>
-      <a:pattFill prst="ltDnDiag">
-        <a:fgClr>
-          <a:schemeClr val="dk1">
-            <a:lumMod val="15000"/>
-            <a:lumOff val="85000"/>
-          </a:schemeClr>
-        </a:fgClr>
-        <a:bgClr>
-          <a:schemeClr val="lt1"/>
-        </a:bgClr>
-      </a:pattFill>
-    </cs:spPr>
-  </cs:plotArea>
-  <cs:plotArea3D>
-    <cs:lnRef idx="0"/>
-    <cs:fillRef idx="0"/>
-    <cs:effectRef idx="0"/>
-    <cs:fontRef idx="minor">
-      <a:schemeClr val="dk1"/>
-    </cs:fontRef>
-    <cs:spPr>
-      <a:solidFill>
-        <a:schemeClr val="lt1"/>
-      </a:solidFill>
-    </cs:spPr>
-  </cs:plotArea3D>
-  <cs:seriesAxis>
-    <cs:lnRef idx="0"/>
-    <cs:fillRef idx="0"/>
-    <cs:effectRef idx="0"/>
-    <cs:fontRef idx="minor">
-      <a:schemeClr val="dk1">
-        <a:lumMod val="65000"/>
-        <a:lumOff val="35000"/>
-      </a:schemeClr>
-    </cs:fontRef>
-    <cs:defRPr sz="900" kern="1200"/>
-  </cs:seriesAxis>
-  <cs:seriesLine>
-    <cs:lnRef idx="0"/>
-    <cs:fillRef idx="0"/>
-    <cs:effectRef idx="0"/>
-    <cs:fontRef idx="minor">
-      <a:schemeClr val="dk1"/>
-    </cs:fontRef>
-    <cs:spPr>
-      <a:ln w="9525" cap="flat" cmpd="sng" algn="ctr">
-        <a:solidFill>
-          <a:schemeClr val="dk1">
-            <a:lumMod val="35000"/>
-            <a:lumOff val="65000"/>
-          </a:schemeClr>
-        </a:solidFill>
-        <a:round/>
-      </a:ln>
-    </cs:spPr>
-  </cs:seriesLine>
-  <cs:title>
-    <cs:lnRef idx="0"/>
-    <cs:fillRef idx="0"/>
-    <cs:effectRef idx="0"/>
-    <cs:fontRef idx="major">
-      <a:schemeClr val="dk1">
-        <a:lumMod val="50000"/>
-        <a:lumOff val="50000"/>
-      </a:schemeClr>
-    </cs:fontRef>
-    <cs:defRPr sz="1600" b="1" kern="1200" cap="none" spc="0" normalizeH="0" baseline="0"/>
-  </cs:title>
-  <cs:trendline>
-    <cs:lnRef idx="0">
-      <cs:styleClr val="auto"/>
-    </cs:lnRef>
-    <cs:fillRef idx="0"/>
-    <cs:effectRef idx="0"/>
-    <cs:fontRef idx="minor">
-      <a:schemeClr val="dk1"/>
-    </cs:fontRef>
-    <cs:spPr>
-      <a:ln w="19050" cap="rnd">
-        <a:solidFill>
-          <a:schemeClr val="phClr"/>
-        </a:solidFill>
-      </a:ln>
-    </cs:spPr>
-  </cs:trendline>
-  <cs:trendlineLabel>
-    <cs:lnRef idx="0"/>
-    <cs:fillRef idx="0"/>
-    <cs:effectRef idx="0"/>
-    <cs:fontRef idx="minor">
-      <a:schemeClr val="dk1">
-        <a:lumMod val="65000"/>
-        <a:lumOff val="35000"/>
-      </a:schemeClr>
-    </cs:fontRef>
-    <cs:defRPr sz="900" kern="1200"/>
-  </cs:trendlineLabel>
-  <cs:upBar>
-    <cs:lnRef idx="0"/>
-    <cs:fillRef idx="0"/>
-    <cs:effectRef idx="0"/>
-    <cs:fontRef idx="minor">
-      <a:schemeClr val="dk1"/>
-    </cs:fontRef>
-    <cs:spPr>
-      <a:solidFill>
-        <a:schemeClr val="lt1"/>
-      </a:solidFill>
-      <a:ln w="9525" cap="flat" cmpd="sng" algn="ctr">
-        <a:solidFill>
-          <a:schemeClr val="dk1">
-            <a:lumMod val="50000"/>
-            <a:lumOff val="50000"/>
-          </a:schemeClr>
-        </a:solidFill>
-        <a:round/>
-      </a:ln>
-    </cs:spPr>
-  </cs:upBar>
-  <cs:valueAxis>
-    <cs:lnRef idx="0"/>
-    <cs:fillRef idx="0"/>
-    <cs:effectRef idx="0"/>
-    <cs:fontRef idx="minor">
-      <a:schemeClr val="dk1">
-        <a:lumMod val="65000"/>
-        <a:lumOff val="35000"/>
-      </a:schemeClr>
-    </cs:fontRef>
-    <cs:defRPr sz="900" kern="1200"/>
-  </cs:valueAxis>
-  <cs:wall>
-    <cs:lnRef idx="0"/>
-    <cs:fillRef idx="0"/>
-    <cs:effectRef idx="0"/>
-    <cs:fontRef idx="minor">
-      <a:schemeClr val="dk1"/>
-    </cs:fontRef>
-    <cs:spPr>
-      <a:pattFill prst="ltDnDiag">
-        <a:fgClr>
-          <a:schemeClr val="dk1">
-            <a:lumMod val="15000"/>
-            <a:lumOff val="85000"/>
-          </a:schemeClr>
-        </a:fgClr>
-        <a:bgClr>
-          <a:schemeClr val="lt1"/>
-        </a:bgClr>
-      </a:pattFill>
-    </cs:spPr>
-  </cs:wall>
-</cs:chartStyle>
 </file>
 
 <file path=ppt/slideLayouts/slideLayout1.xml><?xml version="1.0" encoding="utf-8"?>
@@ -1680,7 +264,7 @@
           <a:p>
             <a:fld id="{FA768D76-16E5-449D-8856-CC23A4ECC98A}" type="datetimeFigureOut">
               <a:rPr lang="en-US" smtClean="0"/>
-              <a:t>11/25/2017</a:t>
+              <a:t>11/26/2017</a:t>
             </a:fld>
             <a:endParaRPr lang="en-US"/>
           </a:p>
@@ -1850,7 +434,7 @@
           <a:p>
             <a:fld id="{FA768D76-16E5-449D-8856-CC23A4ECC98A}" type="datetimeFigureOut">
               <a:rPr lang="en-US" smtClean="0"/>
-              <a:t>11/25/2017</a:t>
+              <a:t>11/26/2017</a:t>
             </a:fld>
             <a:endParaRPr lang="en-US"/>
           </a:p>
@@ -2030,7 +614,7 @@
           <a:p>
             <a:fld id="{FA768D76-16E5-449D-8856-CC23A4ECC98A}" type="datetimeFigureOut">
               <a:rPr lang="en-US" smtClean="0"/>
-              <a:t>11/25/2017</a:t>
+              <a:t>11/26/2017</a:t>
             </a:fld>
             <a:endParaRPr lang="en-US"/>
           </a:p>
@@ -2200,7 +784,7 @@
           <a:p>
             <a:fld id="{FA768D76-16E5-449D-8856-CC23A4ECC98A}" type="datetimeFigureOut">
               <a:rPr lang="en-US" smtClean="0"/>
-              <a:t>11/25/2017</a:t>
+              <a:t>11/26/2017</a:t>
             </a:fld>
             <a:endParaRPr lang="en-US"/>
           </a:p>
@@ -2446,7 +1030,7 @@
           <a:p>
             <a:fld id="{FA768D76-16E5-449D-8856-CC23A4ECC98A}" type="datetimeFigureOut">
               <a:rPr lang="en-US" smtClean="0"/>
-              <a:t>11/25/2017</a:t>
+              <a:t>11/26/2017</a:t>
             </a:fld>
             <a:endParaRPr lang="en-US"/>
           </a:p>
@@ -2678,7 +1262,7 @@
           <a:p>
             <a:fld id="{FA768D76-16E5-449D-8856-CC23A4ECC98A}" type="datetimeFigureOut">
               <a:rPr lang="en-US" smtClean="0"/>
-              <a:t>11/25/2017</a:t>
+              <a:t>11/26/2017</a:t>
             </a:fld>
             <a:endParaRPr lang="en-US"/>
           </a:p>
@@ -3045,7 +1629,7 @@
           <a:p>
             <a:fld id="{FA768D76-16E5-449D-8856-CC23A4ECC98A}" type="datetimeFigureOut">
               <a:rPr lang="en-US" smtClean="0"/>
-              <a:t>11/25/2017</a:t>
+              <a:t>11/26/2017</a:t>
             </a:fld>
             <a:endParaRPr lang="en-US"/>
           </a:p>
@@ -3163,7 +1747,7 @@
           <a:p>
             <a:fld id="{FA768D76-16E5-449D-8856-CC23A4ECC98A}" type="datetimeFigureOut">
               <a:rPr lang="en-US" smtClean="0"/>
-              <a:t>11/25/2017</a:t>
+              <a:t>11/26/2017</a:t>
             </a:fld>
             <a:endParaRPr lang="en-US"/>
           </a:p>
@@ -3258,7 +1842,7 @@
           <a:p>
             <a:fld id="{FA768D76-16E5-449D-8856-CC23A4ECC98A}" type="datetimeFigureOut">
               <a:rPr lang="en-US" smtClean="0"/>
-              <a:t>11/25/2017</a:t>
+              <a:t>11/26/2017</a:t>
             </a:fld>
             <a:endParaRPr lang="en-US"/>
           </a:p>
@@ -3535,7 +2119,7 @@
           <a:p>
             <a:fld id="{FA768D76-16E5-449D-8856-CC23A4ECC98A}" type="datetimeFigureOut">
               <a:rPr lang="en-US" smtClean="0"/>
-              <a:t>11/25/2017</a:t>
+              <a:t>11/26/2017</a:t>
             </a:fld>
             <a:endParaRPr lang="en-US"/>
           </a:p>
@@ -3788,7 +2372,7 @@
           <a:p>
             <a:fld id="{FA768D76-16E5-449D-8856-CC23A4ECC98A}" type="datetimeFigureOut">
               <a:rPr lang="en-US" smtClean="0"/>
-              <a:t>11/25/2017</a:t>
+              <a:t>11/26/2017</a:t>
             </a:fld>
             <a:endParaRPr lang="en-US"/>
           </a:p>
@@ -4001,7 +2585,7 @@
           <a:p>
             <a:fld id="{FA768D76-16E5-449D-8856-CC23A4ECC98A}" type="datetimeFigureOut">
               <a:rPr lang="en-US" smtClean="0"/>
-              <a:t>11/25/2017</a:t>
+              <a:t>11/26/2017</a:t>
             </a:fld>
             <a:endParaRPr lang="en-US"/>
           </a:p>
@@ -4499,7 +3083,7 @@
           <a:p>
             <a:r>
               <a:rPr lang="en-US" dirty="0" smtClean="0"/>
-              <a:t>Regularization Conclusion</a:t>
+              <a:t>Pseudo Code – Recommend Movies</a:t>
             </a:r>
             <a:endParaRPr lang="en-US" dirty="0"/>
           </a:p>
@@ -4522,14 +3106,89 @@
           </a:bodyPr>
           <a:lstStyle/>
           <a:p>
+            <a:r>
+              <a:rPr lang="en-US" dirty="0" smtClean="0"/>
+              <a:t>Combine </a:t>
+            </a:r>
+            <a:r>
+              <a:rPr lang="en-US" dirty="0" err="1"/>
+              <a:t>R</a:t>
+            </a:r>
+            <a:r>
+              <a:rPr lang="en-US" dirty="0" err="1" smtClean="0"/>
+              <a:t>atings_RDD</a:t>
+            </a:r>
+            <a:r>
+              <a:rPr lang="en-US" dirty="0" smtClean="0"/>
+              <a:t> and </a:t>
+            </a:r>
+            <a:r>
+              <a:rPr lang="en-US" dirty="0" err="1" smtClean="0"/>
+              <a:t>new_user_RDD</a:t>
+            </a:r>
             <a:endParaRPr lang="en-US" dirty="0" smtClean="0"/>
+          </a:p>
+          <a:p>
+            <a:r>
+              <a:rPr lang="en-US" dirty="0" smtClean="0"/>
+              <a:t>Train recommender model with updated RDD</a:t>
+            </a:r>
+          </a:p>
+          <a:p>
+            <a:r>
+              <a:rPr lang="en-US" dirty="0" smtClean="0"/>
+              <a:t>Predict new user’s ratings of unseen movies</a:t>
+            </a:r>
+          </a:p>
+          <a:p>
+            <a:pPr lvl="1"/>
+            <a:r>
+              <a:rPr lang="en-US" dirty="0" smtClean="0"/>
+              <a:t>Select all movies that user has not seen</a:t>
+            </a:r>
+          </a:p>
+          <a:p>
+            <a:pPr lvl="1"/>
+            <a:r>
+              <a:rPr lang="en-US" dirty="0" smtClean="0"/>
+              <a:t>Predict ratings of unseen movies with trained model</a:t>
+            </a:r>
+          </a:p>
+          <a:p>
+            <a:r>
+              <a:rPr lang="en-US" dirty="0" smtClean="0"/>
+              <a:t>Join predicted movie ratings RDD and movie names RDD on </a:t>
+            </a:r>
+            <a:r>
+              <a:rPr lang="en-US" dirty="0" err="1" smtClean="0"/>
+              <a:t>movie_id</a:t>
+            </a:r>
+            <a:endParaRPr lang="en-US" dirty="0" smtClean="0"/>
+          </a:p>
+          <a:p>
+            <a:r>
+              <a:rPr lang="en-US" dirty="0" smtClean="0"/>
+              <a:t>Sort join RDD</a:t>
+            </a:r>
+          </a:p>
+          <a:p>
+            <a:r>
+              <a:rPr lang="en-US" dirty="0" smtClean="0"/>
+              <a:t>Return top k movies</a:t>
+            </a:r>
+          </a:p>
+          <a:p>
+            <a:endParaRPr lang="en-US" dirty="0"/>
+          </a:p>
+          <a:p>
+            <a:endParaRPr lang="en-US" dirty="0"/>
           </a:p>
         </p:txBody>
       </p:sp>
     </p:spTree>
     <p:extLst>
       <p:ext uri="{BB962C8B-B14F-4D97-AF65-F5344CB8AC3E}">
-        <p14:creationId xmlns:p14="http://schemas.microsoft.com/office/powerpoint/2010/main" val="4242034754"/>
+        <p14:creationId xmlns:p14="http://schemas.microsoft.com/office/powerpoint/2010/main" val="2919847739"/>
       </p:ext>
     </p:extLst>
   </p:cSld>
@@ -4540,86 +3199,6 @@
 </file>
 
 <file path=ppt/slides/slide11.xml><?xml version="1.0" encoding="utf-8"?>
-<p:sld xmlns:a="http://schemas.openxmlformats.org/drawingml/2006/main" xmlns:r="http://schemas.openxmlformats.org/officeDocument/2006/relationships" xmlns:p="http://schemas.openxmlformats.org/presentationml/2006/main">
-  <p:cSld>
-    <p:spTree>
-      <p:nvGrpSpPr>
-        <p:cNvPr id="1" name=""/>
-        <p:cNvGrpSpPr/>
-        <p:nvPr/>
-      </p:nvGrpSpPr>
-      <p:grpSpPr>
-        <a:xfrm>
-          <a:off x="0" y="0"/>
-          <a:ext cx="0" cy="0"/>
-          <a:chOff x="0" y="0"/>
-          <a:chExt cx="0" cy="0"/>
-        </a:xfrm>
-      </p:grpSpPr>
-      <p:sp>
-        <p:nvSpPr>
-          <p:cNvPr id="2" name="Title 1"/>
-          <p:cNvSpPr>
-            <a:spLocks noGrp="1"/>
-          </p:cNvSpPr>
-          <p:nvPr>
-            <p:ph type="title"/>
-          </p:nvPr>
-        </p:nvSpPr>
-        <p:spPr/>
-        <p:txBody>
-          <a:bodyPr/>
-          <a:lstStyle/>
-          <a:p>
-            <a:r>
-              <a:rPr lang="en-US" dirty="0" smtClean="0"/>
-              <a:t>New </a:t>
-            </a:r>
-            <a:r>
-              <a:rPr lang="en-US" dirty="0" smtClean="0"/>
-              <a:t>User </a:t>
-            </a:r>
-            <a:r>
-              <a:rPr lang="en-US" dirty="0" smtClean="0"/>
-              <a:t>Results</a:t>
-            </a:r>
-            <a:endParaRPr lang="en-US" dirty="0"/>
-          </a:p>
-        </p:txBody>
-      </p:sp>
-      <p:sp>
-        <p:nvSpPr>
-          <p:cNvPr id="3" name="Content Placeholder 2"/>
-          <p:cNvSpPr>
-            <a:spLocks noGrp="1"/>
-          </p:cNvSpPr>
-          <p:nvPr>
-            <p:ph idx="1"/>
-          </p:nvPr>
-        </p:nvSpPr>
-        <p:spPr/>
-        <p:txBody>
-          <a:bodyPr/>
-          <a:lstStyle/>
-          <a:p>
-            <a:endParaRPr lang="en-US"/>
-          </a:p>
-        </p:txBody>
-      </p:sp>
-    </p:spTree>
-    <p:extLst>
-      <p:ext uri="{BB962C8B-B14F-4D97-AF65-F5344CB8AC3E}">
-        <p14:creationId xmlns:p14="http://schemas.microsoft.com/office/powerpoint/2010/main" val="992100898"/>
-      </p:ext>
-    </p:extLst>
-  </p:cSld>
-  <p:clrMapOvr>
-    <a:masterClrMapping/>
-  </p:clrMapOvr>
-</p:sld>
-</file>
-
-<file path=ppt/slides/slide12.xml><?xml version="1.0" encoding="utf-8"?>
 <p:sld xmlns:a="http://schemas.openxmlformats.org/drawingml/2006/main" xmlns:r="http://schemas.openxmlformats.org/officeDocument/2006/relationships" xmlns:p="http://schemas.openxmlformats.org/presentationml/2006/main">
   <p:cSld>
     <p:spTree>
@@ -4926,7 +3505,7 @@
           <a:p>
             <a:r>
               <a:rPr lang="en-US" dirty="0" smtClean="0"/>
-              <a:t>Pseudo Code - Overview</a:t>
+              <a:t>New User Results</a:t>
             </a:r>
             <a:endParaRPr lang="en-US" dirty="0"/>
           </a:p>
@@ -4945,94 +3524,180 @@
         <p:spPr/>
         <p:txBody>
           <a:bodyPr>
-            <a:normAutofit fontScale="92500" lnSpcReduction="10000"/>
+            <a:normAutofit fontScale="92500" lnSpcReduction="20000"/>
           </a:bodyPr>
           <a:lstStyle/>
           <a:p>
             <a:r>
-              <a:rPr lang="en-US" dirty="0" smtClean="0"/>
-              <a:t>Initialize cross validation, model, and metric parameters</a:t>
-            </a:r>
-          </a:p>
-          <a:p>
-            <a:r>
-              <a:rPr lang="en-US" dirty="0" smtClean="0"/>
-              <a:t>Data Processing </a:t>
-            </a:r>
-          </a:p>
-          <a:p>
-            <a:pPr lvl="1"/>
-            <a:r>
-              <a:rPr lang="en-US" dirty="0" smtClean="0"/>
-              <a:t>Convert movies dataset to Ratings RDD</a:t>
-            </a:r>
-          </a:p>
-          <a:p>
-            <a:r>
-              <a:rPr lang="en-US" dirty="0" smtClean="0"/>
-              <a:t>Pre Cross Validation</a:t>
-            </a:r>
-          </a:p>
-          <a:p>
-            <a:pPr lvl="1"/>
-            <a:r>
-              <a:rPr lang="en-US" dirty="0" smtClean="0"/>
-              <a:t>Split data to Test and Train set to evaluate model</a:t>
-            </a:r>
-          </a:p>
-          <a:p>
-            <a:pPr lvl="1"/>
-            <a:r>
-              <a:rPr lang="en-US" dirty="0" smtClean="0"/>
-              <a:t>Create key value pairs representing cv partition and rating</a:t>
-            </a:r>
-          </a:p>
-          <a:p>
-            <a:r>
-              <a:rPr lang="en-US" dirty="0" smtClean="0"/>
-              <a:t>Grid Search and Cross Validation testing</a:t>
-            </a:r>
-          </a:p>
-          <a:p>
-            <a:pPr lvl="1"/>
-            <a:r>
-              <a:rPr lang="en-US" dirty="0" smtClean="0"/>
-              <a:t>For each cv fold train and evaluate recommender model</a:t>
-            </a:r>
-          </a:p>
-          <a:p>
-            <a:r>
-              <a:rPr lang="en-US" dirty="0" smtClean="0"/>
-              <a:t>Evaluate model</a:t>
-            </a:r>
-          </a:p>
-          <a:p>
-            <a:pPr lvl="1"/>
-            <a:r>
-              <a:rPr lang="en-US" dirty="0" smtClean="0"/>
-              <a:t>Train model on training data using best parameters</a:t>
-            </a:r>
-          </a:p>
-          <a:p>
-            <a:pPr lvl="1"/>
-            <a:r>
-              <a:rPr lang="en-US" dirty="0" smtClean="0"/>
-              <a:t>Evaluate model vs test set and output results</a:t>
-            </a:r>
-          </a:p>
-          <a:p>
+              <a:rPr lang="en-US" dirty="0"/>
+              <a:t>V</a:t>
+            </a:r>
+            <a:r>
+              <a:rPr lang="en-US" dirty="0" smtClean="0"/>
+              <a:t>iolence </a:t>
+            </a:r>
+            <a:r>
+              <a:rPr lang="en-US" dirty="0"/>
+              <a:t>at Noon (</a:t>
+            </a:r>
+            <a:r>
+              <a:rPr lang="en-US" dirty="0" err="1"/>
+              <a:t>Hakuchu</a:t>
+            </a:r>
+            <a:r>
+              <a:rPr lang="en-US" dirty="0"/>
+              <a:t> no </a:t>
+            </a:r>
+            <a:r>
+              <a:rPr lang="en-US" dirty="0" err="1"/>
+              <a:t>torima</a:t>
+            </a:r>
+            <a:r>
+              <a:rPr lang="en-US" dirty="0"/>
+              <a:t>) (1966</a:t>
+            </a:r>
+            <a:r>
+              <a:rPr lang="en-US" dirty="0" smtClean="0"/>
+              <a:t>), 13.96</a:t>
+            </a:r>
+          </a:p>
+          <a:p>
+            <a:r>
+              <a:rPr lang="en-US" dirty="0" smtClean="0"/>
+              <a:t>Long, 11.800753144157676</a:t>
+            </a:r>
+          </a:p>
+          <a:p>
+            <a:r>
+              <a:rPr lang="en-US" dirty="0" smtClean="0"/>
+              <a:t>God 2019s </a:t>
+            </a:r>
+            <a:r>
+              <a:rPr lang="en-US" dirty="0"/>
+              <a:t>Wedding (As </a:t>
+            </a:r>
+            <a:r>
+              <a:rPr lang="en-US" dirty="0" err="1"/>
+              <a:t>Bodas</a:t>
+            </a:r>
+            <a:r>
+              <a:rPr lang="en-US" dirty="0"/>
+              <a:t> de Deus) (1999</a:t>
+            </a:r>
+            <a:r>
+              <a:rPr lang="en-US" dirty="0" smtClean="0"/>
+              <a:t>), 11.44</a:t>
+            </a:r>
+          </a:p>
+          <a:p>
+            <a:r>
+              <a:rPr lang="en-US" dirty="0" smtClean="0"/>
+              <a:t>Urban </a:t>
+            </a:r>
+            <a:r>
+              <a:rPr lang="en-US" dirty="0"/>
+              <a:t>Ghost Story (1998</a:t>
+            </a:r>
+            <a:r>
+              <a:rPr lang="en-US" dirty="0" smtClean="0"/>
+              <a:t>), 10.75</a:t>
+            </a:r>
+          </a:p>
+          <a:p>
+            <a:r>
+              <a:rPr lang="en-US" dirty="0" err="1" smtClean="0"/>
+              <a:t>Wilby</a:t>
+            </a:r>
+            <a:r>
+              <a:rPr lang="en-US" dirty="0" smtClean="0"/>
+              <a:t> </a:t>
+            </a:r>
+            <a:r>
+              <a:rPr lang="en-US" dirty="0"/>
+              <a:t>Wonderful (2004</a:t>
+            </a:r>
+            <a:r>
+              <a:rPr lang="en-US" dirty="0" smtClean="0"/>
+              <a:t>), 10.75</a:t>
+            </a:r>
+          </a:p>
+          <a:p>
+            <a:r>
+              <a:rPr lang="en-US" dirty="0" err="1" smtClean="0"/>
+              <a:t>Szamanka</a:t>
+            </a:r>
+            <a:r>
+              <a:rPr lang="en-US" dirty="0" smtClean="0"/>
+              <a:t> </a:t>
+            </a:r>
+            <a:r>
+              <a:rPr lang="en-US" dirty="0"/>
+              <a:t>(1996</a:t>
+            </a:r>
+            <a:r>
+              <a:rPr lang="en-US" dirty="0" smtClean="0"/>
+              <a:t>), 10.56</a:t>
+            </a:r>
+          </a:p>
+          <a:p>
+            <a:r>
+              <a:rPr lang="en-US" dirty="0" smtClean="0"/>
+              <a:t>Screamers (1995), 10.17</a:t>
+            </a:r>
+          </a:p>
+          <a:p>
+            <a:r>
+              <a:rPr lang="en-US" dirty="0"/>
+              <a:t>Ward, The (2010</a:t>
+            </a:r>
+            <a:r>
+              <a:rPr lang="en-US" dirty="0" smtClean="0"/>
+              <a:t>), 10.13</a:t>
+            </a:r>
+          </a:p>
+          <a:p>
+            <a:r>
+              <a:rPr lang="en-US" dirty="0" smtClean="0"/>
+              <a:t>30 </a:t>
+            </a:r>
+            <a:r>
+              <a:rPr lang="en-US" dirty="0"/>
+              <a:t>Minutes or Less (2011</a:t>
+            </a:r>
+            <a:r>
+              <a:rPr lang="en-US" dirty="0" smtClean="0"/>
+              <a:t>), 9.44</a:t>
+            </a:r>
+          </a:p>
+          <a:p>
+            <a:r>
+              <a:rPr lang="en-US" dirty="0"/>
+              <a:t>Toy Story Toons: Small Fry (</a:t>
+            </a:r>
+            <a:r>
+              <a:rPr lang="en-US"/>
+              <a:t>2011</a:t>
+            </a:r>
+            <a:r>
+              <a:rPr lang="en-US" smtClean="0"/>
+              <a:t>),</a:t>
+            </a:r>
+            <a:r>
+              <a:rPr lang="en-US"/>
+              <a:t> </a:t>
+            </a:r>
+            <a:r>
+              <a:rPr lang="en-US" smtClean="0"/>
+              <a:t>9.38</a:t>
+            </a:r>
             <a:endParaRPr lang="en-US" dirty="0"/>
-          </a:p>
-          <a:p>
-            <a:pPr lvl="1"/>
-            <a:endParaRPr lang="en-US" dirty="0" smtClean="0"/>
           </a:p>
         </p:txBody>
       </p:sp>
     </p:spTree>
     <p:extLst>
       <p:ext uri="{BB962C8B-B14F-4D97-AF65-F5344CB8AC3E}">
-        <p14:creationId xmlns:p14="http://schemas.microsoft.com/office/powerpoint/2010/main" val="1365754911"/>
+        <p14:creationId xmlns:p14="http://schemas.microsoft.com/office/powerpoint/2010/main" val="992100898"/>
       </p:ext>
     </p:extLst>
   </p:cSld>
@@ -5076,7 +3741,7 @@
           <a:p>
             <a:r>
               <a:rPr lang="en-US" dirty="0" smtClean="0"/>
-              <a:t>Data Processing </a:t>
+              <a:t>Conclusion</a:t>
             </a:r>
             <a:endParaRPr lang="en-US" dirty="0"/>
           </a:p>
@@ -5095,252 +3760,44 @@
         <p:spPr/>
         <p:txBody>
           <a:bodyPr>
-            <a:normAutofit fontScale="77500" lnSpcReduction="20000"/>
+            <a:normAutofit/>
           </a:bodyPr>
           <a:lstStyle/>
           <a:p>
             <a:r>
-              <a:rPr lang="en-US" dirty="0"/>
-              <a:t>Initialize cross validation, model, and metric parameters</a:t>
-            </a:r>
-          </a:p>
-          <a:p>
-            <a:r>
-              <a:rPr lang="en-US" dirty="0"/>
-              <a:t>Data Processing </a:t>
-            </a:r>
-          </a:p>
-          <a:p>
-            <a:pPr lvl="1"/>
-            <a:r>
-              <a:rPr lang="en-US" dirty="0" smtClean="0"/>
-              <a:t>Read in the data as an RDD of strings</a:t>
-            </a:r>
-          </a:p>
-          <a:p>
-            <a:pPr lvl="2"/>
-            <a:r>
-              <a:rPr lang="en-US" dirty="0" smtClean="0"/>
-              <a:t>RDD = [(‘</a:t>
+              <a:rPr lang="en-US" dirty="0" smtClean="0"/>
+              <a:t>I expected that the higher the rank the more accurate the predictions would be but that did not turn to be the case</a:t>
+            </a:r>
+          </a:p>
+          <a:p>
+            <a:r>
+              <a:rPr lang="en-US" dirty="0" smtClean="0"/>
+              <a:t>The regularization coefficient worked better at lower values</a:t>
+            </a:r>
+          </a:p>
+          <a:p>
+            <a:r>
+              <a:rPr lang="en-US" dirty="0" smtClean="0"/>
+              <a:t>This simple and naive recommender system worked surprisingly well considering it only incorporated users, movies, and ratings</a:t>
+            </a:r>
+            <a:r>
+              <a:rPr lang="en-US" dirty="0" smtClean="0"/>
+              <a:t>.</a:t>
+            </a:r>
+          </a:p>
+          <a:p>
+            <a:r>
+              <a:rPr lang="en-US" dirty="0" smtClean="0"/>
+              <a:t>I plan on watching a few of the recommended movies after the end of the </a:t>
             </a:r>
             <a:r>
               <a:rPr lang="en-US" dirty="0" err="1" smtClean="0"/>
-              <a:t>userid,movieid,rating,timestamp</a:t>
-            </a:r>
-            <a:r>
-              <a:rPr lang="en-US" dirty="0" smtClean="0"/>
-              <a:t>’),…]</a:t>
-            </a:r>
-          </a:p>
-          <a:p>
-            <a:pPr lvl="1"/>
-            <a:r>
-              <a:rPr lang="en-US" dirty="0" smtClean="0"/>
-              <a:t>Split the string based on commas -&gt; </a:t>
-            </a:r>
-            <a:r>
-              <a:rPr lang="en-US" dirty="0" err="1" smtClean="0"/>
-              <a:t>user_id</a:t>
-            </a:r>
-            <a:r>
-              <a:rPr lang="en-US" dirty="0" smtClean="0"/>
-              <a:t>, </a:t>
-            </a:r>
-            <a:r>
-              <a:rPr lang="en-US" dirty="0" err="1" smtClean="0"/>
-              <a:t>movie_id</a:t>
-            </a:r>
-            <a:r>
-              <a:rPr lang="en-US" dirty="0" smtClean="0"/>
-              <a:t>, rating, timestamp</a:t>
-            </a:r>
-          </a:p>
-          <a:p>
-            <a:pPr lvl="2"/>
-            <a:r>
-              <a:rPr lang="en-US" dirty="0" smtClean="0"/>
-              <a:t>RDD = [(‘</a:t>
-            </a:r>
-            <a:r>
-              <a:rPr lang="en-US" dirty="0" err="1" smtClean="0"/>
-              <a:t>userid</a:t>
-            </a:r>
-            <a:r>
-              <a:rPr lang="en-US" dirty="0" smtClean="0"/>
-              <a:t>’, ‘</a:t>
-            </a:r>
-            <a:r>
-              <a:rPr lang="en-US" dirty="0" err="1" smtClean="0"/>
-              <a:t>movieid</a:t>
-            </a:r>
-            <a:r>
-              <a:rPr lang="en-US" dirty="0" smtClean="0"/>
-              <a:t>’, ‘rating’, ‘timestamp’),…]</a:t>
-            </a:r>
-          </a:p>
-          <a:p>
-            <a:pPr lvl="1"/>
-            <a:r>
-              <a:rPr lang="en-US" dirty="0" smtClean="0"/>
-              <a:t>Remove Time stamp</a:t>
-            </a:r>
-          </a:p>
-          <a:p>
-            <a:pPr lvl="2"/>
-            <a:r>
-              <a:rPr lang="en-US" dirty="0"/>
-              <a:t>RDD = [(‘</a:t>
-            </a:r>
-            <a:r>
-              <a:rPr lang="en-US" dirty="0" err="1"/>
-              <a:t>userid</a:t>
-            </a:r>
-            <a:r>
-              <a:rPr lang="en-US" dirty="0"/>
-              <a:t>’, ‘</a:t>
-            </a:r>
-            <a:r>
-              <a:rPr lang="en-US" dirty="0" err="1"/>
-              <a:t>movieid</a:t>
-            </a:r>
-            <a:r>
-              <a:rPr lang="en-US" dirty="0"/>
-              <a:t>’, ‘rating</a:t>
-            </a:r>
-            <a:r>
-              <a:rPr lang="en-US" dirty="0" smtClean="0"/>
-              <a:t>’),…]</a:t>
-            </a:r>
-          </a:p>
-          <a:p>
-            <a:pPr lvl="1"/>
-            <a:r>
-              <a:rPr lang="en-US" dirty="0" smtClean="0"/>
-              <a:t>Convert </a:t>
-            </a:r>
-            <a:r>
-              <a:rPr lang="en-US" dirty="0"/>
-              <a:t>the </a:t>
-            </a:r>
-            <a:r>
-              <a:rPr lang="en-US" dirty="0" err="1"/>
-              <a:t>user_id</a:t>
-            </a:r>
-            <a:r>
-              <a:rPr lang="en-US" dirty="0"/>
-              <a:t> and </a:t>
-            </a:r>
-            <a:r>
-              <a:rPr lang="en-US" dirty="0" err="1"/>
-              <a:t>movie_id</a:t>
-            </a:r>
-            <a:r>
-              <a:rPr lang="en-US" dirty="0"/>
-              <a:t> to </a:t>
-            </a:r>
-            <a:r>
-              <a:rPr lang="en-US" dirty="0" err="1"/>
-              <a:t>ints</a:t>
-            </a:r>
-            <a:r>
-              <a:rPr lang="en-US" dirty="0"/>
-              <a:t> and the rating to a </a:t>
-            </a:r>
-            <a:r>
-              <a:rPr lang="en-US" dirty="0" smtClean="0"/>
-              <a:t>float</a:t>
-            </a:r>
-          </a:p>
-          <a:p>
-            <a:pPr lvl="2"/>
-            <a:r>
-              <a:rPr lang="en-US" dirty="0"/>
-              <a:t>RDD = [(</a:t>
-            </a:r>
-            <a:r>
-              <a:rPr lang="en-US" dirty="0" err="1"/>
-              <a:t>userid</a:t>
-            </a:r>
-            <a:r>
-              <a:rPr lang="en-US" dirty="0"/>
-              <a:t>, </a:t>
-            </a:r>
-            <a:r>
-              <a:rPr lang="en-US" dirty="0" err="1"/>
-              <a:t>movieid</a:t>
-            </a:r>
-            <a:r>
-              <a:rPr lang="en-US" dirty="0"/>
-              <a:t>, rating</a:t>
-            </a:r>
-            <a:r>
-              <a:rPr lang="en-US" dirty="0" smtClean="0"/>
-              <a:t>),…]</a:t>
-            </a:r>
-          </a:p>
-          <a:p>
-            <a:pPr lvl="1"/>
-            <a:r>
-              <a:rPr lang="en-US" dirty="0" smtClean="0"/>
-              <a:t>Convert the values to a Rating object</a:t>
-            </a:r>
-          </a:p>
-          <a:p>
-            <a:pPr lvl="2"/>
-            <a:r>
-              <a:rPr lang="en-US" dirty="0"/>
-              <a:t>RDD = </a:t>
-            </a:r>
-            <a:r>
-              <a:rPr lang="en-US" dirty="0" smtClean="0"/>
-              <a:t>[Rating(</a:t>
-            </a:r>
-            <a:r>
-              <a:rPr lang="en-US" dirty="0" err="1" smtClean="0"/>
-              <a:t>userid</a:t>
-            </a:r>
-            <a:r>
-              <a:rPr lang="en-US" dirty="0"/>
-              <a:t>, </a:t>
-            </a:r>
-            <a:r>
-              <a:rPr lang="en-US" dirty="0" err="1"/>
-              <a:t>movieid</a:t>
-            </a:r>
-            <a:r>
-              <a:rPr lang="en-US" dirty="0"/>
-              <a:t>, rating</a:t>
-            </a:r>
-            <a:r>
-              <a:rPr lang="en-US" dirty="0" smtClean="0"/>
-              <a:t>),…]</a:t>
-            </a:r>
-          </a:p>
-          <a:p>
-            <a:r>
-              <a:rPr lang="en-US" dirty="0"/>
-              <a:t>Pre Cross Validation</a:t>
-            </a:r>
-          </a:p>
-          <a:p>
-            <a:r>
-              <a:rPr lang="en-US" dirty="0" smtClean="0"/>
-              <a:t>Grid </a:t>
-            </a:r>
-            <a:r>
-              <a:rPr lang="en-US" dirty="0"/>
-              <a:t>Search and Cross Validation testing</a:t>
-            </a:r>
-          </a:p>
-          <a:p>
-            <a:r>
-              <a:rPr lang="en-US" dirty="0" smtClean="0"/>
-              <a:t>Evaluate model</a:t>
-            </a:r>
-            <a:endParaRPr lang="en-US" dirty="0"/>
-          </a:p>
-          <a:p>
-            <a:pPr lvl="1"/>
+              <a:t>semster</a:t>
+            </a:r>
+            <a:r>
+              <a:rPr lang="en-US" dirty="0" smtClean="0"/>
+              <a:t> and seeing if I enjoy them. </a:t>
+            </a:r>
             <a:endParaRPr lang="en-US" dirty="0" smtClean="0"/>
           </a:p>
         </p:txBody>
@@ -5348,7 +3805,7 @@
     </p:spTree>
     <p:extLst>
       <p:ext uri="{BB962C8B-B14F-4D97-AF65-F5344CB8AC3E}">
-        <p14:creationId xmlns:p14="http://schemas.microsoft.com/office/powerpoint/2010/main" val="162871786"/>
+        <p14:creationId xmlns:p14="http://schemas.microsoft.com/office/powerpoint/2010/main" val="439310799"/>
       </p:ext>
     </p:extLst>
   </p:cSld>
@@ -5392,7 +3849,7 @@
           <a:p>
             <a:r>
               <a:rPr lang="en-US" dirty="0" smtClean="0"/>
-              <a:t>Pseudo Code – Pre Cross Validation</a:t>
+              <a:t>Pseudo Code - Overview</a:t>
             </a:r>
             <a:endParaRPr lang="en-US" dirty="0"/>
           </a:p>
@@ -5411,7 +3868,7 @@
         <p:spPr/>
         <p:txBody>
           <a:bodyPr>
-            <a:normAutofit/>
+            <a:normAutofit fontScale="92500" lnSpcReduction="20000"/>
           </a:bodyPr>
           <a:lstStyle/>
           <a:p>
@@ -5427,34 +3884,26 @@
             </a:r>
           </a:p>
           <a:p>
-            <a:r>
-              <a:rPr lang="en-US" dirty="0" smtClean="0"/>
-              <a:t>Pre </a:t>
-            </a:r>
-            <a:r>
-              <a:rPr lang="en-US" dirty="0"/>
-              <a:t>Cross </a:t>
-            </a:r>
-            <a:r>
-              <a:rPr lang="en-US" dirty="0" smtClean="0"/>
-              <a:t>Validation</a:t>
-            </a:r>
-          </a:p>
-          <a:p>
             <a:pPr lvl="1"/>
             <a:r>
               <a:rPr lang="en-US" dirty="0" smtClean="0"/>
+              <a:t>Convert movies dataset to Ratings RDD</a:t>
+            </a:r>
+          </a:p>
+          <a:p>
+            <a:r>
+              <a:rPr lang="en-US" dirty="0" smtClean="0"/>
+              <a:t>Pre Cross Validation</a:t>
+            </a:r>
+          </a:p>
+          <a:p>
+            <a:pPr lvl="1"/>
+            <a:r>
+              <a:rPr lang="en-US" dirty="0" smtClean="0"/>
               <a:t>Split data to Test and Train set to evaluate model</a:t>
             </a:r>
           </a:p>
           <a:p>
-            <a:pPr lvl="2"/>
-            <a:r>
-              <a:rPr lang="en-US" dirty="0" smtClean="0"/>
-              <a:t>E.g. split dataset into 80% train and 20% test partitions</a:t>
-            </a:r>
-          </a:p>
-          <a:p>
             <a:pPr lvl="1"/>
             <a:r>
               <a:rPr lang="en-US" dirty="0" smtClean="0"/>
@@ -5462,83 +3911,43 @@
             </a:r>
           </a:p>
           <a:p>
-            <a:pPr lvl="2"/>
-            <a:r>
-              <a:rPr lang="en-US" dirty="0" smtClean="0"/>
-              <a:t>Generate a random number between 1 and k number of cross validation folds</a:t>
-            </a:r>
-          </a:p>
-          <a:p>
-            <a:pPr lvl="2"/>
-            <a:r>
-              <a:rPr lang="en-US" dirty="0" smtClean="0"/>
-              <a:t>To: </a:t>
-            </a:r>
-            <a:r>
-              <a:rPr lang="en-US" dirty="0" err="1" smtClean="0"/>
-              <a:t>cv_RDD</a:t>
-            </a:r>
-            <a:r>
-              <a:rPr lang="en-US" dirty="0" smtClean="0"/>
-              <a:t> </a:t>
-            </a:r>
-            <a:r>
-              <a:rPr lang="en-US" dirty="0"/>
-              <a:t>= </a:t>
-            </a:r>
-            <a:r>
-              <a:rPr lang="en-US" dirty="0" smtClean="0"/>
-              <a:t>[(~U[1,k], Rating(</a:t>
-            </a:r>
-            <a:r>
-              <a:rPr lang="en-US" dirty="0" err="1" smtClean="0"/>
-              <a:t>userid</a:t>
-            </a:r>
-            <a:r>
-              <a:rPr lang="en-US" dirty="0"/>
-              <a:t>, </a:t>
-            </a:r>
-            <a:r>
-              <a:rPr lang="en-US" dirty="0" err="1"/>
-              <a:t>movieid</a:t>
-            </a:r>
-            <a:r>
-              <a:rPr lang="en-US" dirty="0"/>
-              <a:t>, rating</a:t>
-            </a:r>
-            <a:r>
-              <a:rPr lang="en-US" dirty="0" smtClean="0"/>
-              <a:t>)),…]</a:t>
-            </a:r>
-          </a:p>
-          <a:p>
-            <a:r>
-              <a:rPr lang="en-US" dirty="0" smtClean="0"/>
-              <a:t>Grid </a:t>
-            </a:r>
-            <a:r>
-              <a:rPr lang="en-US" dirty="0"/>
-              <a:t>Search and Cross Validation testing</a:t>
-            </a:r>
-          </a:p>
-          <a:p>
-            <a:r>
-              <a:rPr lang="en-US" dirty="0" smtClean="0"/>
-              <a:t>Evaluate </a:t>
-            </a:r>
-            <a:r>
-              <a:rPr lang="en-US" dirty="0"/>
-              <a:t>model</a:t>
-            </a:r>
-          </a:p>
-          <a:p>
-            <a:endParaRPr lang="en-US" dirty="0" smtClean="0"/>
-          </a:p>
-          <a:p>
-            <a:endParaRPr lang="en-US" dirty="0" smtClean="0"/>
-          </a:p>
-          <a:p>
-            <a:endParaRPr lang="en-US" dirty="0" smtClean="0"/>
+            <a:r>
+              <a:rPr lang="en-US" dirty="0" smtClean="0"/>
+              <a:t>Grid Search and Cross Validation testing</a:t>
+            </a:r>
+          </a:p>
+          <a:p>
+            <a:pPr lvl="1"/>
+            <a:r>
+              <a:rPr lang="en-US" dirty="0" smtClean="0"/>
+              <a:t>For each cv fold train and evaluate recommender model</a:t>
+            </a:r>
+          </a:p>
+          <a:p>
+            <a:r>
+              <a:rPr lang="en-US" dirty="0" smtClean="0"/>
+              <a:t>Evaluate model</a:t>
+            </a:r>
+          </a:p>
+          <a:p>
+            <a:pPr lvl="1"/>
+            <a:r>
+              <a:rPr lang="en-US" dirty="0" smtClean="0"/>
+              <a:t>Train model on training data using best parameters</a:t>
+            </a:r>
+          </a:p>
+          <a:p>
+            <a:pPr lvl="1"/>
+            <a:r>
+              <a:rPr lang="en-US" dirty="0" smtClean="0"/>
+              <a:t>Evaluate model vs test set and output results</a:t>
+            </a:r>
+          </a:p>
+          <a:p>
+            <a:r>
+              <a:rPr lang="en-US" dirty="0" smtClean="0"/>
+              <a:t>Recommend Movies</a:t>
+            </a:r>
           </a:p>
           <a:p>
             <a:endParaRPr lang="en-US" dirty="0"/>
@@ -5552,7 +3961,7 @@
     </p:spTree>
     <p:extLst>
       <p:ext uri="{BB962C8B-B14F-4D97-AF65-F5344CB8AC3E}">
-        <p14:creationId xmlns:p14="http://schemas.microsoft.com/office/powerpoint/2010/main" val="1724373274"/>
+        <p14:creationId xmlns:p14="http://schemas.microsoft.com/office/powerpoint/2010/main" val="1365754911"/>
       </p:ext>
     </p:extLst>
   </p:cSld>
@@ -5596,7 +4005,7 @@
           <a:p>
             <a:r>
               <a:rPr lang="en-US" dirty="0" smtClean="0"/>
-              <a:t>Pseudo Code – Cross Validation</a:t>
+              <a:t>Data Processing </a:t>
             </a:r>
             <a:endParaRPr lang="en-US" dirty="0"/>
           </a:p>
@@ -5615,7 +4024,7 @@
         <p:spPr/>
         <p:txBody>
           <a:bodyPr>
-            <a:normAutofit fontScale="85000" lnSpcReduction="20000"/>
+            <a:normAutofit fontScale="77500" lnSpcReduction="20000"/>
           </a:bodyPr>
           <a:lstStyle/>
           <a:p>
@@ -5631,139 +4040,232 @@
             </a:r>
           </a:p>
           <a:p>
+            <a:pPr lvl="1"/>
+            <a:r>
+              <a:rPr lang="en-US" dirty="0" smtClean="0"/>
+              <a:t>Read in the data as an RDD of strings</a:t>
+            </a:r>
+          </a:p>
+          <a:p>
+            <a:pPr lvl="2"/>
+            <a:r>
+              <a:rPr lang="en-US" dirty="0" smtClean="0"/>
+              <a:t>RDD = [(‘</a:t>
+            </a:r>
+            <a:r>
+              <a:rPr lang="en-US" dirty="0" err="1" smtClean="0"/>
+              <a:t>userid,movieid,rating,timestamp</a:t>
+            </a:r>
+            <a:r>
+              <a:rPr lang="en-US" dirty="0" smtClean="0"/>
+              <a:t>’),…]</a:t>
+            </a:r>
+          </a:p>
+          <a:p>
+            <a:pPr lvl="1"/>
+            <a:r>
+              <a:rPr lang="en-US" dirty="0" smtClean="0"/>
+              <a:t>Split the string based on commas -&gt; </a:t>
+            </a:r>
+            <a:r>
+              <a:rPr lang="en-US" dirty="0" err="1" smtClean="0"/>
+              <a:t>user_id</a:t>
+            </a:r>
+            <a:r>
+              <a:rPr lang="en-US" dirty="0" smtClean="0"/>
+              <a:t>, </a:t>
+            </a:r>
+            <a:r>
+              <a:rPr lang="en-US" dirty="0" err="1" smtClean="0"/>
+              <a:t>movie_id</a:t>
+            </a:r>
+            <a:r>
+              <a:rPr lang="en-US" dirty="0" smtClean="0"/>
+              <a:t>, rating, timestamp</a:t>
+            </a:r>
+          </a:p>
+          <a:p>
+            <a:pPr lvl="2"/>
+            <a:r>
+              <a:rPr lang="en-US" dirty="0" smtClean="0"/>
+              <a:t>RDD = [(‘</a:t>
+            </a:r>
+            <a:r>
+              <a:rPr lang="en-US" dirty="0" err="1" smtClean="0"/>
+              <a:t>userid</a:t>
+            </a:r>
+            <a:r>
+              <a:rPr lang="en-US" dirty="0" smtClean="0"/>
+              <a:t>’, ‘</a:t>
+            </a:r>
+            <a:r>
+              <a:rPr lang="en-US" dirty="0" err="1" smtClean="0"/>
+              <a:t>movieid</a:t>
+            </a:r>
+            <a:r>
+              <a:rPr lang="en-US" dirty="0" smtClean="0"/>
+              <a:t>’, ‘rating’, ‘timestamp’),…]</a:t>
+            </a:r>
+          </a:p>
+          <a:p>
+            <a:pPr lvl="1"/>
+            <a:r>
+              <a:rPr lang="en-US" dirty="0" smtClean="0"/>
+              <a:t>Remove Time stamp</a:t>
+            </a:r>
+          </a:p>
+          <a:p>
+            <a:pPr lvl="2"/>
             <a:r>
               <a:rPr lang="en-US" dirty="0"/>
-              <a:t>Pre Cross </a:t>
-            </a:r>
-            <a:r>
-              <a:rPr lang="en-US" dirty="0" smtClean="0"/>
-              <a:t>Validation</a:t>
-            </a:r>
-          </a:p>
-          <a:p>
-            <a:r>
-              <a:rPr lang="en-US" dirty="0" smtClean="0"/>
-              <a:t>Grid Search and Cross Validation testing</a:t>
+              <a:t>RDD = [(‘</a:t>
+            </a:r>
+            <a:r>
+              <a:rPr lang="en-US" dirty="0" err="1"/>
+              <a:t>userid</a:t>
+            </a:r>
+            <a:r>
+              <a:rPr lang="en-US" dirty="0"/>
+              <a:t>’, ‘</a:t>
+            </a:r>
+            <a:r>
+              <a:rPr lang="en-US" dirty="0" err="1"/>
+              <a:t>movieid</a:t>
+            </a:r>
+            <a:r>
+              <a:rPr lang="en-US" dirty="0"/>
+              <a:t>’, ‘rating</a:t>
+            </a:r>
+            <a:r>
+              <a:rPr lang="en-US" dirty="0" smtClean="0"/>
+              <a:t>’),…]</a:t>
             </a:r>
           </a:p>
           <a:p>
             <a:pPr lvl="1"/>
             <a:r>
               <a:rPr lang="en-US" dirty="0" smtClean="0"/>
-              <a:t>For each parameter in grid search</a:t>
+              <a:t>Convert </a:t>
+            </a:r>
+            <a:r>
+              <a:rPr lang="en-US" dirty="0"/>
+              <a:t>the </a:t>
+            </a:r>
+            <a:r>
+              <a:rPr lang="en-US" dirty="0" err="1"/>
+              <a:t>user_id</a:t>
+            </a:r>
+            <a:r>
+              <a:rPr lang="en-US" dirty="0"/>
+              <a:t> and </a:t>
+            </a:r>
+            <a:r>
+              <a:rPr lang="en-US" dirty="0" err="1"/>
+              <a:t>movie_id</a:t>
+            </a:r>
+            <a:r>
+              <a:rPr lang="en-US" dirty="0"/>
+              <a:t> to </a:t>
+            </a:r>
+            <a:r>
+              <a:rPr lang="en-US" dirty="0" err="1"/>
+              <a:t>ints</a:t>
+            </a:r>
+            <a:r>
+              <a:rPr lang="en-US" dirty="0"/>
+              <a:t> and the rating to a </a:t>
+            </a:r>
+            <a:r>
+              <a:rPr lang="en-US" dirty="0" smtClean="0"/>
+              <a:t>float</a:t>
+            </a:r>
+          </a:p>
+          <a:p>
+            <a:pPr lvl="2"/>
+            <a:r>
+              <a:rPr lang="en-US" dirty="0"/>
+              <a:t>RDD = [(</a:t>
+            </a:r>
+            <a:r>
+              <a:rPr lang="en-US" dirty="0" err="1"/>
+              <a:t>userid</a:t>
+            </a:r>
+            <a:r>
+              <a:rPr lang="en-US" dirty="0"/>
+              <a:t>, </a:t>
+            </a:r>
+            <a:r>
+              <a:rPr lang="en-US" dirty="0" err="1"/>
+              <a:t>movieid</a:t>
+            </a:r>
+            <a:r>
+              <a:rPr lang="en-US" dirty="0"/>
+              <a:t>, rating</a:t>
+            </a:r>
+            <a:r>
+              <a:rPr lang="en-US" dirty="0" smtClean="0"/>
+              <a:t>),…]</a:t>
             </a:r>
           </a:p>
           <a:p>
             <a:pPr lvl="1"/>
             <a:r>
               <a:rPr lang="en-US" dirty="0" smtClean="0"/>
-              <a:t>For each cv fold</a:t>
+              <a:t>Convert the values to a Rating object</a:t>
             </a:r>
           </a:p>
           <a:p>
             <a:pPr lvl="2"/>
             <a:r>
               <a:rPr lang="en-US" dirty="0"/>
-              <a:t>M</a:t>
-            </a:r>
-            <a:r>
-              <a:rPr lang="en-US" dirty="0" smtClean="0"/>
-              <a:t>ake this fold the </a:t>
+              <a:t>RDD = </a:t>
+            </a:r>
+            <a:r>
+              <a:rPr lang="en-US" dirty="0" smtClean="0"/>
+              <a:t>[Rating(</a:t>
             </a:r>
             <a:r>
               <a:rPr lang="en-US" dirty="0" err="1" smtClean="0"/>
-              <a:t>validation_rdd</a:t>
-            </a:r>
-            <a:r>
-              <a:rPr lang="en-US" dirty="0" smtClean="0"/>
-              <a:t> and all other folds the </a:t>
-            </a:r>
-            <a:r>
-              <a:rPr lang="en-US" dirty="0" err="1" smtClean="0"/>
-              <a:t>training_rdd</a:t>
-            </a:r>
-            <a:endParaRPr lang="en-US" dirty="0" smtClean="0"/>
-          </a:p>
-          <a:p>
-            <a:pPr lvl="2"/>
-            <a:r>
-              <a:rPr lang="en-US" dirty="0" smtClean="0"/>
-              <a:t>Instantiate recommendation model with grid search parameters</a:t>
-            </a:r>
-          </a:p>
-          <a:p>
-            <a:pPr lvl="2"/>
-            <a:r>
-              <a:rPr lang="en-US" dirty="0" smtClean="0"/>
-              <a:t>Train the </a:t>
+              <a:t>userid</a:t>
             </a:r>
             <a:r>
               <a:rPr lang="en-US" dirty="0"/>
-              <a:t>recommendation model </a:t>
-            </a:r>
-            <a:r>
-              <a:rPr lang="en-US" dirty="0" smtClean="0"/>
-              <a:t>on the training </a:t>
-            </a:r>
-            <a:r>
-              <a:rPr lang="en-US" dirty="0" err="1" smtClean="0"/>
-              <a:t>rdd</a:t>
-            </a:r>
-            <a:endParaRPr lang="en-US" dirty="0" smtClean="0"/>
-          </a:p>
-          <a:p>
-            <a:pPr lvl="2"/>
-            <a:r>
-              <a:rPr lang="en-US" dirty="0" smtClean="0"/>
-              <a:t>Predict </a:t>
-            </a:r>
-            <a:r>
-              <a:rPr lang="en-US" dirty="0" err="1" smtClean="0"/>
-              <a:t>validation_rdd</a:t>
-            </a:r>
-            <a:r>
-              <a:rPr lang="en-US" dirty="0" smtClean="0"/>
-              <a:t> ratings using trained model</a:t>
-            </a:r>
-          </a:p>
-          <a:p>
-            <a:pPr lvl="2"/>
-            <a:r>
-              <a:rPr lang="en-US" dirty="0" smtClean="0"/>
-              <a:t>Evaluate predictions</a:t>
-            </a:r>
-          </a:p>
-          <a:p>
-            <a:pPr lvl="2"/>
-            <a:r>
-              <a:rPr lang="en-US" dirty="0" smtClean="0"/>
-              <a:t>Store predictions</a:t>
-            </a:r>
-          </a:p>
-          <a:p>
-            <a:pPr lvl="2"/>
-            <a:r>
-              <a:rPr lang="en-US" dirty="0" smtClean="0"/>
-              <a:t>End of loop</a:t>
-            </a:r>
-          </a:p>
-          <a:p>
+              <a:t>, </a:t>
+            </a:r>
+            <a:r>
+              <a:rPr lang="en-US" dirty="0" err="1"/>
+              <a:t>movieid</a:t>
+            </a:r>
             <a:r>
               <a:rPr lang="en-US" dirty="0"/>
-              <a:t>Evaluate </a:t>
-            </a:r>
-            <a:r>
-              <a:rPr lang="en-US" dirty="0" smtClean="0"/>
-              <a:t>model</a:t>
-            </a:r>
-          </a:p>
-          <a:p>
-            <a:endParaRPr lang="en-US" dirty="0" smtClean="0"/>
-          </a:p>
-          <a:p>
-            <a:endParaRPr lang="en-US" dirty="0" smtClean="0"/>
-          </a:p>
-          <a:p>
+              <a:t>, rating</a:t>
+            </a:r>
+            <a:r>
+              <a:rPr lang="en-US" dirty="0" smtClean="0"/>
+              <a:t>),…]</a:t>
+            </a:r>
+          </a:p>
+          <a:p>
+            <a:r>
+              <a:rPr lang="en-US" dirty="0"/>
+              <a:t>Pre Cross Validation</a:t>
+            </a:r>
+          </a:p>
+          <a:p>
+            <a:r>
+              <a:rPr lang="en-US" dirty="0" smtClean="0"/>
+              <a:t>Grid </a:t>
+            </a:r>
+            <a:r>
+              <a:rPr lang="en-US" dirty="0"/>
+              <a:t>Search and Cross Validation testing</a:t>
+            </a:r>
+          </a:p>
+          <a:p>
+            <a:r>
+              <a:rPr lang="en-US" dirty="0" smtClean="0"/>
+              <a:t>Evaluate model</a:t>
+            </a:r>
             <a:endParaRPr lang="en-US" dirty="0"/>
           </a:p>
           <a:p>
@@ -5775,7 +4277,7 @@
     </p:spTree>
     <p:extLst>
       <p:ext uri="{BB962C8B-B14F-4D97-AF65-F5344CB8AC3E}">
-        <p14:creationId xmlns:p14="http://schemas.microsoft.com/office/powerpoint/2010/main" val="4106078279"/>
+        <p14:creationId xmlns:p14="http://schemas.microsoft.com/office/powerpoint/2010/main" val="162871786"/>
       </p:ext>
     </p:extLst>
   </p:cSld>
@@ -5819,7 +4321,7 @@
           <a:p>
             <a:r>
               <a:rPr lang="en-US" dirty="0" smtClean="0"/>
-              <a:t>Pseudo Code - Evaluate Model</a:t>
+              <a:t>Pseudo Code – Pre Cross Validation</a:t>
             </a:r>
             <a:endParaRPr lang="en-US" dirty="0"/>
           </a:p>
@@ -5838,25 +4340,104 @@
         <p:spPr/>
         <p:txBody>
           <a:bodyPr>
-            <a:normAutofit fontScale="92500" lnSpcReduction="10000"/>
+            <a:normAutofit/>
           </a:bodyPr>
           <a:lstStyle/>
           <a:p>
             <a:r>
+              <a:rPr lang="en-US" dirty="0" smtClean="0"/>
+              <a:t>Initialize cross validation, model, and metric parameters</a:t>
+            </a:r>
+          </a:p>
+          <a:p>
+            <a:r>
+              <a:rPr lang="en-US" dirty="0" smtClean="0"/>
+              <a:t>Data Processing </a:t>
+            </a:r>
+          </a:p>
+          <a:p>
+            <a:r>
+              <a:rPr lang="en-US" dirty="0" smtClean="0"/>
+              <a:t>Pre </a:t>
+            </a:r>
+            <a:r>
               <a:rPr lang="en-US" dirty="0"/>
-              <a:t>Initialize cross validation, model, and metric parameters</a:t>
-            </a:r>
-          </a:p>
-          <a:p>
+              <a:t>Cross </a:t>
+            </a:r>
+            <a:r>
+              <a:rPr lang="en-US" dirty="0" smtClean="0"/>
+              <a:t>Validation</a:t>
+            </a:r>
+          </a:p>
+          <a:p>
+            <a:pPr lvl="1"/>
+            <a:r>
+              <a:rPr lang="en-US" dirty="0" smtClean="0"/>
+              <a:t>Split data to Test and Train set to evaluate model</a:t>
+            </a:r>
+          </a:p>
+          <a:p>
+            <a:pPr lvl="2"/>
+            <a:r>
+              <a:rPr lang="en-US" dirty="0" smtClean="0"/>
+              <a:t>E.g. split dataset into 80% train and 20% test partitions</a:t>
+            </a:r>
+          </a:p>
+          <a:p>
+            <a:pPr lvl="1"/>
+            <a:r>
+              <a:rPr lang="en-US" dirty="0" smtClean="0"/>
+              <a:t>Create key value pairs representing cv partition and rating</a:t>
+            </a:r>
+          </a:p>
+          <a:p>
+            <a:pPr lvl="2"/>
+            <a:r>
+              <a:rPr lang="en-US" dirty="0" smtClean="0"/>
+              <a:t>Generate a random number between 1 and k number of cross validation folds</a:t>
+            </a:r>
+          </a:p>
+          <a:p>
+            <a:pPr lvl="2"/>
+            <a:r>
+              <a:rPr lang="en-US" dirty="0" smtClean="0"/>
+              <a:t>To: </a:t>
+            </a:r>
+            <a:r>
+              <a:rPr lang="en-US" dirty="0" err="1" smtClean="0"/>
+              <a:t>cv_RDD</a:t>
+            </a:r>
+            <a:r>
+              <a:rPr lang="en-US" dirty="0" smtClean="0"/>
+              <a:t> </a:t>
+            </a:r>
             <a:r>
               <a:rPr lang="en-US" dirty="0"/>
-              <a:t>Data Processing </a:t>
-            </a:r>
-          </a:p>
-          <a:p>
+              <a:t>= </a:t>
+            </a:r>
+            <a:r>
+              <a:rPr lang="en-US" dirty="0" smtClean="0"/>
+              <a:t>[(~U[1,k], Rating(</a:t>
+            </a:r>
+            <a:r>
+              <a:rPr lang="en-US" dirty="0" err="1" smtClean="0"/>
+              <a:t>userid</a:t>
+            </a:r>
             <a:r>
               <a:rPr lang="en-US" dirty="0"/>
-              <a:t>Pre Cross Validation</a:t>
+              <a:t>, </a:t>
+            </a:r>
+            <a:r>
+              <a:rPr lang="en-US" dirty="0" err="1"/>
+              <a:t>movieid</a:t>
+            </a:r>
+            <a:r>
+              <a:rPr lang="en-US" dirty="0"/>
+              <a:t>, rating</a:t>
+            </a:r>
+            <a:r>
+              <a:rPr lang="en-US" dirty="0" smtClean="0"/>
+              <a:t>)),…]</a:t>
             </a:r>
           </a:p>
           <a:p>
@@ -5872,70 +4453,35 @@
           <a:p>
             <a:r>
               <a:rPr lang="en-US" dirty="0" smtClean="0"/>
-              <a:t>Evaluate model</a:t>
-            </a:r>
+              <a:t>Evaluate </a:t>
+            </a:r>
+            <a:r>
+              <a:rPr lang="en-US" dirty="0"/>
+              <a:t>model</a:t>
+            </a:r>
+          </a:p>
+          <a:p>
+            <a:endParaRPr lang="en-US" dirty="0" smtClean="0"/>
+          </a:p>
+          <a:p>
+            <a:endParaRPr lang="en-US" dirty="0" smtClean="0"/>
+          </a:p>
+          <a:p>
+            <a:endParaRPr lang="en-US" dirty="0" smtClean="0"/>
+          </a:p>
+          <a:p>
+            <a:endParaRPr lang="en-US" dirty="0"/>
           </a:p>
           <a:p>
             <a:pPr lvl="1"/>
-            <a:r>
-              <a:rPr lang="en-US" dirty="0" smtClean="0"/>
-              <a:t>Output training results to disk</a:t>
-            </a:r>
-            <a:endParaRPr lang="en-US" dirty="0"/>
-          </a:p>
-          <a:p>
-            <a:pPr lvl="1"/>
-            <a:r>
-              <a:rPr lang="en-US" dirty="0" smtClean="0"/>
-              <a:t>Find training model parameters with lowest average CV RMSE</a:t>
-            </a:r>
-          </a:p>
-          <a:p>
-            <a:pPr lvl="1"/>
-            <a:r>
-              <a:rPr lang="en-US" dirty="0" smtClean="0"/>
-              <a:t>Instantiate model with retrieved parameters</a:t>
-            </a:r>
-          </a:p>
-          <a:p>
-            <a:pPr lvl="1"/>
-            <a:r>
-              <a:rPr lang="en-US" dirty="0" smtClean="0"/>
-              <a:t>Train </a:t>
-            </a:r>
-            <a:r>
-              <a:rPr lang="en-US" dirty="0"/>
-              <a:t>model on training </a:t>
-            </a:r>
-            <a:r>
-              <a:rPr lang="en-US" dirty="0" smtClean="0"/>
-              <a:t>data</a:t>
-            </a:r>
-          </a:p>
-          <a:p>
-            <a:pPr lvl="1"/>
-            <a:r>
-              <a:rPr lang="en-US" dirty="0" smtClean="0"/>
-              <a:t>Evaluate model</a:t>
-            </a:r>
-          </a:p>
-          <a:p>
-            <a:pPr lvl="1"/>
-            <a:r>
-              <a:rPr lang="en-US" dirty="0" smtClean="0"/>
-              <a:t>Output test results to disk</a:t>
-            </a:r>
-            <a:endParaRPr lang="en-US" dirty="0"/>
-          </a:p>
-          <a:p>
-            <a:endParaRPr lang="en-US" dirty="0"/>
+            <a:endParaRPr lang="en-US" dirty="0" smtClean="0"/>
           </a:p>
         </p:txBody>
       </p:sp>
     </p:spTree>
     <p:extLst>
       <p:ext uri="{BB962C8B-B14F-4D97-AF65-F5344CB8AC3E}">
-        <p14:creationId xmlns:p14="http://schemas.microsoft.com/office/powerpoint/2010/main" val="1181186570"/>
+        <p14:creationId xmlns:p14="http://schemas.microsoft.com/office/powerpoint/2010/main" val="1724373274"/>
       </p:ext>
     </p:extLst>
   </p:cSld>
@@ -5977,115 +4523,188 @@
           <a:bodyPr/>
           <a:lstStyle/>
           <a:p>
-            <a:pPr algn="ctr"/>
-            <a:r>
-              <a:rPr lang="en-US" dirty="0" smtClean="0"/>
-              <a:t>Average RMSE </a:t>
-            </a:r>
+            <a:r>
+              <a:rPr lang="en-US" dirty="0" smtClean="0"/>
+              <a:t>Pseudo Code – Cross Validation</a:t>
+            </a:r>
+            <a:endParaRPr lang="en-US" dirty="0"/>
+          </a:p>
+        </p:txBody>
+      </p:sp>
+      <p:sp>
+        <p:nvSpPr>
+          <p:cNvPr id="3" name="Content Placeholder 2"/>
+          <p:cNvSpPr>
+            <a:spLocks noGrp="1"/>
+          </p:cNvSpPr>
+          <p:nvPr>
+            <p:ph idx="1"/>
+          </p:nvPr>
+        </p:nvSpPr>
+        <p:spPr/>
+        <p:txBody>
+          <a:bodyPr>
+            <a:normAutofit fontScale="85000" lnSpcReduction="20000"/>
+          </a:bodyPr>
+          <a:lstStyle/>
+          <a:p>
             <a:r>
               <a:rPr lang="en-US" dirty="0"/>
-              <a:t>Comparison with/out Regularization</a:t>
-            </a:r>
-          </a:p>
-        </p:txBody>
-      </p:sp>
-      <p:sp>
-        <p:nvSpPr>
-          <p:cNvPr id="5" name="TextBox 4"/>
-          <p:cNvSpPr txBox="1"/>
-          <p:nvPr/>
-        </p:nvSpPr>
-        <p:spPr>
-          <a:xfrm>
-            <a:off x="1344705" y="6078071"/>
-            <a:ext cx="5719483" cy="646331"/>
-          </a:xfrm>
-          <a:prstGeom prst="rect">
-            <a:avLst/>
-          </a:prstGeom>
-          <a:noFill/>
-        </p:spPr>
-        <p:txBody>
-          <a:bodyPr wrap="square" rtlCol="0">
-            <a:spAutoFit/>
-          </a:bodyPr>
-          <a:lstStyle/>
-          <a:p>
-            <a:r>
-              <a:rPr lang="en-US" dirty="0" smtClean="0"/>
-              <a:t>Blue – No regularization</a:t>
-            </a:r>
-            <a:br>
-              <a:rPr lang="en-US" dirty="0" smtClean="0"/>
-            </a:br>
-            <a:r>
-              <a:rPr lang="en-US" dirty="0" smtClean="0"/>
-              <a:t>Orange – Regularization was used</a:t>
-            </a:r>
+              <a:t>Initialize cross validation, model, and metric parameters</a:t>
+            </a:r>
+          </a:p>
+          <a:p>
+            <a:r>
+              <a:rPr lang="en-US" dirty="0"/>
+              <a:t>Data Processing </a:t>
+            </a:r>
+          </a:p>
+          <a:p>
+            <a:r>
+              <a:rPr lang="en-US" dirty="0"/>
+              <a:t>Pre Cross </a:t>
+            </a:r>
+            <a:r>
+              <a:rPr lang="en-US" dirty="0" smtClean="0"/>
+              <a:t>Validation</a:t>
+            </a:r>
+          </a:p>
+          <a:p>
+            <a:r>
+              <a:rPr lang="en-US" dirty="0" smtClean="0"/>
+              <a:t>Grid Search and Cross Validation testing</a:t>
+            </a:r>
+          </a:p>
+          <a:p>
+            <a:pPr lvl="1"/>
+            <a:r>
+              <a:rPr lang="en-US" dirty="0" smtClean="0"/>
+              <a:t>For each parameter in grid search</a:t>
+            </a:r>
+          </a:p>
+          <a:p>
+            <a:pPr lvl="1"/>
+            <a:r>
+              <a:rPr lang="en-US" dirty="0" smtClean="0"/>
+              <a:t>For each cv fold</a:t>
+            </a:r>
+          </a:p>
+          <a:p>
+            <a:pPr lvl="2"/>
+            <a:r>
+              <a:rPr lang="en-US" dirty="0"/>
+              <a:t>M</a:t>
+            </a:r>
+            <a:r>
+              <a:rPr lang="en-US" dirty="0" smtClean="0"/>
+              <a:t>ake this fold the </a:t>
+            </a:r>
+            <a:r>
+              <a:rPr lang="en-US" dirty="0" err="1" smtClean="0"/>
+              <a:t>validation_rdd</a:t>
+            </a:r>
+            <a:r>
+              <a:rPr lang="en-US" dirty="0" smtClean="0"/>
+              <a:t> and all other folds the </a:t>
+            </a:r>
+            <a:r>
+              <a:rPr lang="en-US" dirty="0" err="1" smtClean="0"/>
+              <a:t>training_rdd</a:t>
+            </a:r>
+            <a:endParaRPr lang="en-US" dirty="0" smtClean="0"/>
+          </a:p>
+          <a:p>
+            <a:pPr lvl="2"/>
+            <a:r>
+              <a:rPr lang="en-US" dirty="0" smtClean="0"/>
+              <a:t>Instantiate recommendation model with grid search parameters</a:t>
+            </a:r>
+          </a:p>
+          <a:p>
+            <a:pPr lvl="2"/>
+            <a:r>
+              <a:rPr lang="en-US" dirty="0" smtClean="0"/>
+              <a:t>Train the </a:t>
+            </a:r>
+            <a:r>
+              <a:rPr lang="en-US" dirty="0"/>
+              <a:t>recommendation model </a:t>
+            </a:r>
+            <a:r>
+              <a:rPr lang="en-US" dirty="0" smtClean="0"/>
+              <a:t>on the training </a:t>
+            </a:r>
+            <a:r>
+              <a:rPr lang="en-US" dirty="0" err="1" smtClean="0"/>
+              <a:t>rdd</a:t>
+            </a:r>
+            <a:endParaRPr lang="en-US" dirty="0" smtClean="0"/>
+          </a:p>
+          <a:p>
+            <a:pPr lvl="2"/>
+            <a:r>
+              <a:rPr lang="en-US" dirty="0" smtClean="0"/>
+              <a:t>Predict </a:t>
+            </a:r>
+            <a:r>
+              <a:rPr lang="en-US" dirty="0" err="1" smtClean="0"/>
+              <a:t>validation_rdd</a:t>
+            </a:r>
+            <a:r>
+              <a:rPr lang="en-US" dirty="0" smtClean="0"/>
+              <a:t> ratings using trained model</a:t>
+            </a:r>
+          </a:p>
+          <a:p>
+            <a:pPr lvl="2"/>
+            <a:r>
+              <a:rPr lang="en-US" dirty="0" smtClean="0"/>
+              <a:t>Evaluate predictions</a:t>
+            </a:r>
+          </a:p>
+          <a:p>
+            <a:pPr lvl="2"/>
+            <a:r>
+              <a:rPr lang="en-US" dirty="0" smtClean="0"/>
+              <a:t>Store predictions</a:t>
+            </a:r>
+          </a:p>
+          <a:p>
+            <a:pPr lvl="2"/>
+            <a:r>
+              <a:rPr lang="en-US" dirty="0" smtClean="0"/>
+              <a:t>End of loop</a:t>
+            </a:r>
+          </a:p>
+          <a:p>
+            <a:r>
+              <a:rPr lang="en-US" dirty="0"/>
+              <a:t>Evaluate </a:t>
+            </a:r>
+            <a:r>
+              <a:rPr lang="en-US" dirty="0" smtClean="0"/>
+              <a:t>model</a:t>
+            </a:r>
+          </a:p>
+          <a:p>
+            <a:endParaRPr lang="en-US" dirty="0" smtClean="0"/>
+          </a:p>
+          <a:p>
+            <a:endParaRPr lang="en-US" dirty="0" smtClean="0"/>
+          </a:p>
+          <a:p>
             <a:endParaRPr lang="en-US" dirty="0"/>
           </a:p>
-        </p:txBody>
-      </p:sp>
-      <p:graphicFrame>
-        <p:nvGraphicFramePr>
-          <p:cNvPr id="7" name="Content Placeholder 6"/>
-          <p:cNvGraphicFramePr>
-            <a:graphicFrameLocks noGrp="1"/>
-          </p:cNvGraphicFramePr>
-          <p:nvPr>
-            <p:ph idx="1"/>
-            <p:extLst>
-              <p:ext uri="{D42A27DB-BD31-4B8C-83A1-F6EECF244321}">
-                <p14:modId xmlns:p14="http://schemas.microsoft.com/office/powerpoint/2010/main" val="2593973861"/>
-              </p:ext>
-            </p:extLst>
-          </p:nvPr>
-        </p:nvGraphicFramePr>
-        <p:xfrm>
-          <a:off x="838200" y="1825625"/>
-          <a:ext cx="10515600" cy="4351338"/>
-        </p:xfrm>
-        <a:graphic>
-          <a:graphicData uri="http://schemas.openxmlformats.org/drawingml/2006/chart">
-            <c:chart xmlns:c="http://schemas.openxmlformats.org/drawingml/2006/chart" xmlns:r="http://schemas.openxmlformats.org/officeDocument/2006/relationships" r:id="rId2"/>
-          </a:graphicData>
-        </a:graphic>
-      </p:graphicFrame>
-      <p:cxnSp>
-        <p:nvCxnSpPr>
-          <p:cNvPr id="9" name="Straight Connector 8"/>
-          <p:cNvCxnSpPr/>
-          <p:nvPr/>
-        </p:nvCxnSpPr>
-        <p:spPr>
-          <a:xfrm>
-            <a:off x="6751674" y="2785730"/>
-            <a:ext cx="3009014" cy="1541721"/>
-          </a:xfrm>
-          <a:prstGeom prst="line">
-            <a:avLst/>
-          </a:prstGeom>
-          <a:ln/>
-        </p:spPr>
-        <p:style>
-          <a:lnRef idx="3">
-            <a:schemeClr val="accent2"/>
-          </a:lnRef>
-          <a:fillRef idx="0">
-            <a:schemeClr val="accent2"/>
-          </a:fillRef>
-          <a:effectRef idx="2">
-            <a:schemeClr val="accent2"/>
-          </a:effectRef>
-          <a:fontRef idx="minor">
-            <a:schemeClr val="tx1"/>
-          </a:fontRef>
-        </p:style>
-      </p:cxnSp>
+          <a:p>
+            <a:pPr lvl="1"/>
+            <a:endParaRPr lang="en-US" dirty="0" smtClean="0"/>
+          </a:p>
+        </p:txBody>
+      </p:sp>
     </p:spTree>
     <p:extLst>
       <p:ext uri="{BB962C8B-B14F-4D97-AF65-F5344CB8AC3E}">
-        <p14:creationId xmlns:p14="http://schemas.microsoft.com/office/powerpoint/2010/main" val="3457739250"/>
+        <p14:creationId xmlns:p14="http://schemas.microsoft.com/office/powerpoint/2010/main" val="4106078279"/>
       </p:ext>
     </p:extLst>
   </p:cSld>
@@ -6129,7 +4748,7 @@
           <a:p>
             <a:r>
               <a:rPr lang="en-US" dirty="0" smtClean="0"/>
-              <a:t>Rank Conclusion</a:t>
+              <a:t>Pseudo Code - Evaluate Model</a:t>
             </a:r>
             <a:endParaRPr lang="en-US" dirty="0"/>
           </a:p>
@@ -6148,18 +4767,104 @@
         <p:spPr/>
         <p:txBody>
           <a:bodyPr>
-            <a:normAutofit/>
+            <a:normAutofit fontScale="92500" lnSpcReduction="10000"/>
           </a:bodyPr>
           <a:lstStyle/>
           <a:p>
-            <a:endParaRPr lang="en-US" dirty="0" smtClean="0"/>
+            <a:r>
+              <a:rPr lang="en-US" dirty="0"/>
+              <a:t>Initialize cross validation, model, and metric parameters</a:t>
+            </a:r>
+          </a:p>
+          <a:p>
+            <a:r>
+              <a:rPr lang="en-US" dirty="0"/>
+              <a:t>Data Processing </a:t>
+            </a:r>
+          </a:p>
+          <a:p>
+            <a:r>
+              <a:rPr lang="en-US" dirty="0"/>
+              <a:t>Pre Cross Validation</a:t>
+            </a:r>
+          </a:p>
+          <a:p>
+            <a:r>
+              <a:rPr lang="en-US" dirty="0" smtClean="0"/>
+              <a:t>Grid </a:t>
+            </a:r>
+            <a:r>
+              <a:rPr lang="en-US" dirty="0"/>
+              <a:t>Search and Cross Validation testing</a:t>
+            </a:r>
+          </a:p>
+          <a:p>
+            <a:r>
+              <a:rPr lang="en-US" dirty="0" smtClean="0"/>
+              <a:t>Evaluate model</a:t>
+            </a:r>
+          </a:p>
+          <a:p>
+            <a:pPr lvl="1"/>
+            <a:r>
+              <a:rPr lang="en-US" dirty="0" smtClean="0"/>
+              <a:t>Output training results to disk</a:t>
+            </a:r>
+            <a:endParaRPr lang="en-US" dirty="0"/>
+          </a:p>
+          <a:p>
+            <a:pPr lvl="1"/>
+            <a:r>
+              <a:rPr lang="en-US" dirty="0" smtClean="0"/>
+              <a:t>Find training model parameters with lowest average CV RMSE</a:t>
+            </a:r>
+          </a:p>
+          <a:p>
+            <a:pPr lvl="1"/>
+            <a:r>
+              <a:rPr lang="en-US" dirty="0" smtClean="0"/>
+              <a:t>Instantiate model with retrieved parameters</a:t>
+            </a:r>
+          </a:p>
+          <a:p>
+            <a:pPr lvl="1"/>
+            <a:r>
+              <a:rPr lang="en-US" dirty="0" smtClean="0"/>
+              <a:t>Train </a:t>
+            </a:r>
+            <a:r>
+              <a:rPr lang="en-US" dirty="0"/>
+              <a:t>model on training </a:t>
+            </a:r>
+            <a:r>
+              <a:rPr lang="en-US" dirty="0" smtClean="0"/>
+              <a:t>data</a:t>
+            </a:r>
+          </a:p>
+          <a:p>
+            <a:pPr lvl="1"/>
+            <a:r>
+              <a:rPr lang="en-US" dirty="0" smtClean="0"/>
+              <a:t>Evaluate model</a:t>
+            </a:r>
+          </a:p>
+          <a:p>
+            <a:pPr lvl="1"/>
+            <a:r>
+              <a:rPr lang="en-US" dirty="0" smtClean="0"/>
+              <a:t>Output test results to disk</a:t>
+            </a:r>
+            <a:endParaRPr lang="en-US" dirty="0"/>
+          </a:p>
+          <a:p>
+            <a:endParaRPr lang="en-US" dirty="0"/>
           </a:p>
         </p:txBody>
       </p:sp>
     </p:spTree>
     <p:extLst>
       <p:ext uri="{BB962C8B-B14F-4D97-AF65-F5344CB8AC3E}">
-        <p14:creationId xmlns:p14="http://schemas.microsoft.com/office/powerpoint/2010/main" val="439310799"/>
+        <p14:creationId xmlns:p14="http://schemas.microsoft.com/office/powerpoint/2010/main" val="1181186570"/>
       </p:ext>
     </p:extLst>
   </p:cSld>
@@ -6174,10 +4879,10 @@
   <a:themeElements>
     <a:clrScheme name="Office">
       <a:dk1>
-        <a:sysClr val="windowText" lastClr="000000"/>
+        <a:sysClr val="windowText" lastClr="FFFF00"/>
       </a:dk1>
       <a:lt1>
-        <a:sysClr val="window" lastClr="FFFFFF"/>
+        <a:sysClr val="window" lastClr="000000"/>
       </a:lt1>
       <a:dk2>
         <a:srgbClr val="44546A"/>
@@ -6424,7 +5129,7 @@
   <a:extraClrSchemeLst/>
   <a:extLst>
     <a:ext uri="{05A4C25C-085E-4340-85A3-A5531E510DB2}">
-      <thm15:themeFamily xmlns:thm15="http://schemas.microsoft.com/office/thememl/2012/main" name="Office Theme" id="{62F939B6-93AF-4DB8-9C6B-D6C7DFDC589F}" vid="{4A3C46E8-61CC-4603-A589-7422A47A8E4A}"/>
+      <thm15:themeFamily xmlns="" xmlns:thm15="http://schemas.microsoft.com/office/thememl/2012/main" name="Office Theme" id="{62F939B6-93AF-4DB8-9C6B-D6C7DFDC589F}" vid="{4A3C46E8-61CC-4603-A589-7422A47A8E4A}"/>
     </a:ext>
   </a:extLst>
 </a:theme>

</xml_diff>